<commit_message>
Modificaciones Reporte de monitoreo Marzo
</commit_message>
<xml_diff>
--- a/qualtcom/Organizacional/Medicion y Monitoreo/Reporte Monitoreo-150331.pptx
+++ b/qualtcom/Organizacional/Medicion y Monitoreo/Reporte Monitoreo-150331.pptx
@@ -5,6 +5,9 @@
     <p:sldMasterId id="2147483648" r:id="rId1"/>
     <p:sldMasterId id="2147483661" r:id="rId2"/>
   </p:sldMasterIdLst>
+  <p:notesMasterIdLst>
+    <p:notesMasterId r:id="rId16"/>
+  </p:notesMasterIdLst>
   <p:sldIdLst>
     <p:sldId id="256" r:id="rId3"/>
     <p:sldId id="259" r:id="rId4"/>
@@ -18,6 +21,7 @@
     <p:sldId id="267" r:id="rId12"/>
     <p:sldId id="269" r:id="rId13"/>
     <p:sldId id="268" r:id="rId14"/>
+    <p:sldId id="270" r:id="rId15"/>
   </p:sldIdLst>
   <p:sldSz cx="9144000" cy="6858000" type="screen4x3"/>
   <p:notesSz cx="7772400" cy="10058400"/>
@@ -165,7 +169,6 @@
           </a:p>
         </c:rich>
       </c:tx>
-      <c:layout/>
       <c:overlay val="0"/>
     </c:title>
     <c:autoTitleDeleted val="0"/>
@@ -211,7 +214,7 @@
                 <c:formatCode>_-"$"* #,##0.00_-;\-"$"* #,##0.00_-;_-"$"* "-"??_-;_-@_-</c:formatCode>
                 <c:ptCount val="2"/>
                 <c:pt idx="0">
-                  <c:v>11653</c:v>
+                  <c:v>9989</c:v>
                 </c:pt>
                 <c:pt idx="1">
                   <c:v>5693.7300000000005</c:v>
@@ -261,10 +264,10 @@
                 <c:formatCode>_-"$"* #,##0.00_-;\-"$"* #,##0.00_-;_-"$"* "-"??_-;_-@_-</c:formatCode>
                 <c:ptCount val="2"/>
                 <c:pt idx="0">
-                  <c:v>4329.6000000000004</c:v>
+                  <c:v>1664.8</c:v>
                 </c:pt>
                 <c:pt idx="1">
-                  <c:v>4000</c:v>
+                  <c:v>3123.4</c:v>
                 </c:pt>
               </c:numCache>
             </c:numRef>
@@ -284,11 +287,11 @@
           <c:showBubbleSize val="0"/>
         </c:dLbls>
         <c:gapWidth val="150"/>
-        <c:axId val="183347168"/>
-        <c:axId val="183347728"/>
+        <c:axId val="98565264"/>
+        <c:axId val="98565824"/>
       </c:barChart>
       <c:catAx>
-        <c:axId val="183347168"/>
+        <c:axId val="98565264"/>
         <c:scaling>
           <c:orientation val="minMax"/>
         </c:scaling>
@@ -298,7 +301,7 @@
         <c:majorTickMark val="none"/>
         <c:minorTickMark val="none"/>
         <c:tickLblPos val="nextTo"/>
-        <c:crossAx val="183347728"/>
+        <c:crossAx val="98565824"/>
         <c:crosses val="autoZero"/>
         <c:auto val="1"/>
         <c:lblAlgn val="ctr"/>
@@ -306,7 +309,7 @@
         <c:noMultiLvlLbl val="0"/>
       </c:catAx>
       <c:valAx>
-        <c:axId val="183347728"/>
+        <c:axId val="98565824"/>
         <c:scaling>
           <c:orientation val="minMax"/>
         </c:scaling>
@@ -317,14 +320,13 @@
         <c:majorTickMark val="none"/>
         <c:minorTickMark val="none"/>
         <c:tickLblPos val="nextTo"/>
-        <c:crossAx val="183347168"/>
+        <c:crossAx val="98565264"/>
         <c:crosses val="autoZero"/>
         <c:crossBetween val="between"/>
       </c:valAx>
     </c:plotArea>
     <c:legend>
       <c:legendPos val="r"/>
-      <c:layout/>
       <c:overlay val="0"/>
     </c:legend>
     <c:plotVisOnly val="1"/>
@@ -367,7 +369,6 @@
           </a:p>
         </c:rich>
       </c:tx>
-      <c:layout/>
       <c:overlay val="0"/>
     </c:title>
     <c:autoTitleDeleted val="0"/>
@@ -413,7 +414,7 @@
                 <c:formatCode>0%</c:formatCode>
                 <c:ptCount val="2"/>
                 <c:pt idx="0">
-                  <c:v>0.6284561915386595</c:v>
+                  <c:v>0.83333667033737113</c:v>
                 </c:pt>
                 <c:pt idx="1">
                   <c:v>0.45143166254810119</c:v>
@@ -436,11 +437,11 @@
           <c:showBubbleSize val="0"/>
         </c:dLbls>
         <c:gapWidth val="150"/>
-        <c:axId val="189318464"/>
-        <c:axId val="189315664"/>
+        <c:axId val="98568064"/>
+        <c:axId val="98733488"/>
       </c:barChart>
       <c:catAx>
-        <c:axId val="189318464"/>
+        <c:axId val="98568064"/>
         <c:scaling>
           <c:orientation val="minMax"/>
         </c:scaling>
@@ -450,7 +451,7 @@
         <c:majorTickMark val="out"/>
         <c:minorTickMark val="none"/>
         <c:tickLblPos val="nextTo"/>
-        <c:crossAx val="189315664"/>
+        <c:crossAx val="98733488"/>
         <c:crosses val="autoZero"/>
         <c:auto val="1"/>
         <c:lblAlgn val="ctr"/>
@@ -458,7 +459,7 @@
         <c:noMultiLvlLbl val="0"/>
       </c:catAx>
       <c:valAx>
-        <c:axId val="189315664"/>
+        <c:axId val="98733488"/>
         <c:scaling>
           <c:orientation val="minMax"/>
           <c:max val="1"/>
@@ -471,7 +472,7 @@
         <c:majorTickMark val="out"/>
         <c:minorTickMark val="none"/>
         <c:tickLblPos val="nextTo"/>
-        <c:crossAx val="189318464"/>
+        <c:crossAx val="98568064"/>
         <c:crosses val="autoZero"/>
         <c:crossBetween val="between"/>
       </c:valAx>
@@ -510,202 +511,12 @@
               <a:defRPr/>
             </a:pPr>
             <a:r>
-              <a:rPr lang="en-US"/>
-              <a:t>Desviación</a:t>
+              <a:rPr lang="es-MX"/>
+              <a:t>Esfuerzo</a:t>
             </a:r>
           </a:p>
         </c:rich>
       </c:tx>
-      <c:layout/>
-      <c:overlay val="0"/>
-    </c:title>
-    <c:autoTitleDeleted val="0"/>
-    <c:plotArea>
-      <c:layout/>
-      <c:barChart>
-        <c:barDir val="col"/>
-        <c:grouping val="clustered"/>
-        <c:varyColors val="0"/>
-        <c:ser>
-          <c:idx val="0"/>
-          <c:order val="0"/>
-          <c:tx>
-            <c:strRef>
-              <c:f>'Desviacion de esfuerzo'!$F$18:$F$19</c:f>
-              <c:strCache>
-                <c:ptCount val="2"/>
-                <c:pt idx="1">
-                  <c:v>Desviación</c:v>
-                </c:pt>
-              </c:strCache>
-            </c:strRef>
-          </c:tx>
-          <c:invertIfNegative val="0"/>
-          <c:cat>
-            <c:multiLvlStrRef>
-              <c:f>'Desviacion de esfuerzo'!$B$20:$C$26</c:f>
-              <c:multiLvlStrCache>
-                <c:ptCount val="7"/>
-                <c:lvl>
-                  <c:pt idx="0">
-                    <c:v>Preventivo</c:v>
-                  </c:pt>
-                  <c:pt idx="1">
-                    <c:v>Correctivo</c:v>
-                  </c:pt>
-                  <c:pt idx="2">
-                    <c:v>Preventivo</c:v>
-                  </c:pt>
-                  <c:pt idx="3">
-                    <c:v>Correctivo</c:v>
-                  </c:pt>
-                </c:lvl>
-                <c:lvl>
-                  <c:pt idx="0">
-                    <c:v>Entrega de Servicio</c:v>
-                  </c:pt>
-                  <c:pt idx="2">
-                    <c:v>Planeación</c:v>
-                  </c:pt>
-                  <c:pt idx="4">
-                    <c:v>Medicion-Monitoreo</c:v>
-                  </c:pt>
-                  <c:pt idx="5">
-                    <c:v>Calidad</c:v>
-                  </c:pt>
-                  <c:pt idx="6">
-                    <c:v>Configuracion</c:v>
-                  </c:pt>
-                </c:lvl>
-              </c:multiLvlStrCache>
-            </c:multiLvlStrRef>
-          </c:cat>
-          <c:val>
-            <c:numRef>
-              <c:f>'Desviacion de esfuerzo'!$F$20:$F$26</c:f>
-              <c:numCache>
-                <c:formatCode>0%</c:formatCode>
-                <c:ptCount val="7"/>
-                <c:pt idx="0">
-                  <c:v>0.77857142857142858</c:v>
-                </c:pt>
-                <c:pt idx="1">
-                  <c:v>0.93571428571428572</c:v>
-                </c:pt>
-                <c:pt idx="2">
-                  <c:v>0.34210526315789486</c:v>
-                </c:pt>
-                <c:pt idx="3">
-                  <c:v>0.5614035087719299</c:v>
-                </c:pt>
-                <c:pt idx="4">
-                  <c:v>0</c:v>
-                </c:pt>
-                <c:pt idx="5">
-                  <c:v>0.19999999999999996</c:v>
-                </c:pt>
-                <c:pt idx="6">
-                  <c:v>0.65999999999999992</c:v>
-                </c:pt>
-              </c:numCache>
-            </c:numRef>
-          </c:val>
-          <c:extLst>
-            <c:ext xmlns:c16="http://schemas.microsoft.com/office/drawing/2014/chart" uri="{C3380CC4-5D6E-409C-BE32-E72D297353CC}">
-              <c16:uniqueId val="{00000000-3C06-4A10-8FB4-B31601AB0A35}"/>
-            </c:ext>
-          </c:extLst>
-        </c:ser>
-        <c:dLbls>
-          <c:showLegendKey val="0"/>
-          <c:showVal val="0"/>
-          <c:showCatName val="0"/>
-          <c:showSerName val="0"/>
-          <c:showPercent val="0"/>
-          <c:showBubbleSize val="0"/>
-        </c:dLbls>
-        <c:gapWidth val="150"/>
-        <c:axId val="195308240"/>
-        <c:axId val="195307680"/>
-      </c:barChart>
-      <c:catAx>
-        <c:axId val="195308240"/>
-        <c:scaling>
-          <c:orientation val="minMax"/>
-        </c:scaling>
-        <c:delete val="0"/>
-        <c:axPos val="b"/>
-        <c:numFmt formatCode="General" sourceLinked="0"/>
-        <c:majorTickMark val="out"/>
-        <c:minorTickMark val="none"/>
-        <c:tickLblPos val="nextTo"/>
-        <c:crossAx val="195307680"/>
-        <c:crosses val="autoZero"/>
-        <c:auto val="1"/>
-        <c:lblAlgn val="ctr"/>
-        <c:lblOffset val="100"/>
-        <c:noMultiLvlLbl val="0"/>
-      </c:catAx>
-      <c:valAx>
-        <c:axId val="195307680"/>
-        <c:scaling>
-          <c:orientation val="minMax"/>
-          <c:max val="1"/>
-          <c:min val="0"/>
-        </c:scaling>
-        <c:delete val="0"/>
-        <c:axPos val="l"/>
-        <c:majorGridlines/>
-        <c:numFmt formatCode="0%" sourceLinked="1"/>
-        <c:majorTickMark val="out"/>
-        <c:minorTickMark val="none"/>
-        <c:tickLblPos val="nextTo"/>
-        <c:crossAx val="195308240"/>
-        <c:crosses val="autoZero"/>
-        <c:crossBetween val="between"/>
-      </c:valAx>
-    </c:plotArea>
-    <c:plotVisOnly val="1"/>
-    <c:dispBlanksAs val="gap"/>
-    <c:showDLblsOverMax val="0"/>
-  </c:chart>
-  <c:externalData r:id="rId1">
-    <c:autoUpdate val="0"/>
-  </c:externalData>
-</c:chartSpace>
-</file>
-
-<file path=ppt/charts/chart4.xml><?xml version="1.0" encoding="utf-8"?>
-<c:chartSpace xmlns:c="http://schemas.openxmlformats.org/drawingml/2006/chart" xmlns:a="http://schemas.openxmlformats.org/drawingml/2006/main" xmlns:r="http://schemas.openxmlformats.org/officeDocument/2006/relationships">
-  <c:date1904 val="0"/>
-  <c:lang val="es-ES"/>
-  <c:roundedCorners val="0"/>
-  <mc:AlternateContent xmlns:mc="http://schemas.openxmlformats.org/markup-compatibility/2006">
-    <mc:Choice xmlns:c14="http://schemas.microsoft.com/office/drawing/2007/8/2/chart" Requires="c14">
-      <c14:style val="102"/>
-    </mc:Choice>
-    <mc:Fallback>
-      <c:style val="2"/>
-    </mc:Fallback>
-  </mc:AlternateContent>
-  <c:chart>
-    <c:title>
-      <c:tx>
-        <c:rich>
-          <a:bodyPr/>
-          <a:lstStyle/>
-          <a:p>
-            <a:pPr>
-              <a:defRPr/>
-            </a:pPr>
-            <a:r>
-              <a:rPr lang="es-MX"/>
-              <a:t>Esfuerzo</a:t>
-            </a:r>
-          </a:p>
-        </c:rich>
-      </c:tx>
-      <c:layout/>
       <c:overlay val="0"/>
     </c:title>
     <c:autoTitleDeleted val="0"/>
@@ -776,10 +587,10 @@
                 <c:formatCode>General</c:formatCode>
                 <c:ptCount val="7"/>
                 <c:pt idx="0">
-                  <c:v>140</c:v>
+                  <c:v>91.2</c:v>
                 </c:pt>
                 <c:pt idx="1">
-                  <c:v>140</c:v>
+                  <c:v>45.6</c:v>
                 </c:pt>
                 <c:pt idx="2">
                   <c:v>45.600000000000009</c:v>
@@ -904,11 +715,11 @@
           <c:showBubbleSize val="0"/>
         </c:dLbls>
         <c:gapWidth val="150"/>
-        <c:axId val="196534672"/>
-        <c:axId val="196536352"/>
+        <c:axId val="98736288"/>
+        <c:axId val="98736848"/>
       </c:barChart>
       <c:catAx>
-        <c:axId val="196534672"/>
+        <c:axId val="98736288"/>
         <c:scaling>
           <c:orientation val="minMax"/>
         </c:scaling>
@@ -918,7 +729,7 @@
         <c:majorTickMark val="none"/>
         <c:minorTickMark val="none"/>
         <c:tickLblPos val="nextTo"/>
-        <c:crossAx val="196536352"/>
+        <c:crossAx val="98736848"/>
         <c:crosses val="autoZero"/>
         <c:auto val="1"/>
         <c:lblAlgn val="ctr"/>
@@ -926,7 +737,7 @@
         <c:noMultiLvlLbl val="0"/>
       </c:catAx>
       <c:valAx>
-        <c:axId val="196536352"/>
+        <c:axId val="98736848"/>
         <c:scaling>
           <c:orientation val="minMax"/>
         </c:scaling>
@@ -937,16 +748,203 @@
         <c:majorTickMark val="none"/>
         <c:minorTickMark val="none"/>
         <c:tickLblPos val="nextTo"/>
-        <c:crossAx val="196534672"/>
+        <c:crossAx val="98736288"/>
         <c:crosses val="autoZero"/>
         <c:crossBetween val="between"/>
       </c:valAx>
     </c:plotArea>
     <c:legend>
       <c:legendPos val="r"/>
-      <c:layout/>
       <c:overlay val="0"/>
     </c:legend>
+    <c:plotVisOnly val="1"/>
+    <c:dispBlanksAs val="gap"/>
+    <c:showDLblsOverMax val="0"/>
+  </c:chart>
+  <c:externalData r:id="rId1">
+    <c:autoUpdate val="0"/>
+  </c:externalData>
+</c:chartSpace>
+</file>
+
+<file path=ppt/charts/chart4.xml><?xml version="1.0" encoding="utf-8"?>
+<c:chartSpace xmlns:c="http://schemas.openxmlformats.org/drawingml/2006/chart" xmlns:a="http://schemas.openxmlformats.org/drawingml/2006/main" xmlns:r="http://schemas.openxmlformats.org/officeDocument/2006/relationships">
+  <c:date1904 val="0"/>
+  <c:lang val="es-ES"/>
+  <c:roundedCorners val="0"/>
+  <mc:AlternateContent xmlns:mc="http://schemas.openxmlformats.org/markup-compatibility/2006">
+    <mc:Choice xmlns:c14="http://schemas.microsoft.com/office/drawing/2007/8/2/chart" Requires="c14">
+      <c14:style val="102"/>
+    </mc:Choice>
+    <mc:Fallback>
+      <c:style val="2"/>
+    </mc:Fallback>
+  </mc:AlternateContent>
+  <c:chart>
+    <c:title>
+      <c:tx>
+        <c:rich>
+          <a:bodyPr/>
+          <a:lstStyle/>
+          <a:p>
+            <a:pPr>
+              <a:defRPr/>
+            </a:pPr>
+            <a:r>
+              <a:rPr lang="en-US"/>
+              <a:t>Desviación</a:t>
+            </a:r>
+          </a:p>
+        </c:rich>
+      </c:tx>
+      <c:overlay val="0"/>
+    </c:title>
+    <c:autoTitleDeleted val="0"/>
+    <c:plotArea>
+      <c:layout/>
+      <c:barChart>
+        <c:barDir val="col"/>
+        <c:grouping val="clustered"/>
+        <c:varyColors val="0"/>
+        <c:ser>
+          <c:idx val="0"/>
+          <c:order val="0"/>
+          <c:tx>
+            <c:strRef>
+              <c:f>'Desviacion de esfuerzo'!$F$18:$F$19</c:f>
+              <c:strCache>
+                <c:ptCount val="2"/>
+                <c:pt idx="1">
+                  <c:v>Desviación</c:v>
+                </c:pt>
+              </c:strCache>
+            </c:strRef>
+          </c:tx>
+          <c:invertIfNegative val="0"/>
+          <c:cat>
+            <c:multiLvlStrRef>
+              <c:f>'Desviacion de esfuerzo'!$B$20:$C$26</c:f>
+              <c:multiLvlStrCache>
+                <c:ptCount val="7"/>
+                <c:lvl>
+                  <c:pt idx="0">
+                    <c:v>Preventivo</c:v>
+                  </c:pt>
+                  <c:pt idx="1">
+                    <c:v>Correctivo</c:v>
+                  </c:pt>
+                  <c:pt idx="2">
+                    <c:v>Preventivo</c:v>
+                  </c:pt>
+                  <c:pt idx="3">
+                    <c:v>Correctivo</c:v>
+                  </c:pt>
+                </c:lvl>
+                <c:lvl>
+                  <c:pt idx="0">
+                    <c:v>Entrega de Servicio</c:v>
+                  </c:pt>
+                  <c:pt idx="2">
+                    <c:v>Planeación</c:v>
+                  </c:pt>
+                  <c:pt idx="4">
+                    <c:v>Medicion-Monitoreo</c:v>
+                  </c:pt>
+                  <c:pt idx="5">
+                    <c:v>Calidad</c:v>
+                  </c:pt>
+                  <c:pt idx="6">
+                    <c:v>Configuracion</c:v>
+                  </c:pt>
+                </c:lvl>
+              </c:multiLvlStrCache>
+            </c:multiLvlStrRef>
+          </c:cat>
+          <c:val>
+            <c:numRef>
+              <c:f>'Desviacion de esfuerzo'!$F$20:$F$26</c:f>
+              <c:numCache>
+                <c:formatCode>0%</c:formatCode>
+                <c:ptCount val="7"/>
+                <c:pt idx="0">
+                  <c:v>0.66008771929824561</c:v>
+                </c:pt>
+                <c:pt idx="1">
+                  <c:v>0.80263157894736847</c:v>
+                </c:pt>
+                <c:pt idx="2">
+                  <c:v>0.34210526315789486</c:v>
+                </c:pt>
+                <c:pt idx="3">
+                  <c:v>0.5614035087719299</c:v>
+                </c:pt>
+                <c:pt idx="4">
+                  <c:v>0</c:v>
+                </c:pt>
+                <c:pt idx="5">
+                  <c:v>0.19999999999999996</c:v>
+                </c:pt>
+                <c:pt idx="6">
+                  <c:v>0.65999999999999992</c:v>
+                </c:pt>
+              </c:numCache>
+            </c:numRef>
+          </c:val>
+          <c:extLst>
+            <c:ext xmlns:c16="http://schemas.microsoft.com/office/drawing/2014/chart" uri="{C3380CC4-5D6E-409C-BE32-E72D297353CC}">
+              <c16:uniqueId val="{00000000-3C06-4A10-8FB4-B31601AB0A35}"/>
+            </c:ext>
+          </c:extLst>
+        </c:ser>
+        <c:dLbls>
+          <c:showLegendKey val="0"/>
+          <c:showVal val="0"/>
+          <c:showCatName val="0"/>
+          <c:showSerName val="0"/>
+          <c:showPercent val="0"/>
+          <c:showBubbleSize val="0"/>
+        </c:dLbls>
+        <c:gapWidth val="150"/>
+        <c:axId val="99093776"/>
+        <c:axId val="99094336"/>
+      </c:barChart>
+      <c:catAx>
+        <c:axId val="99093776"/>
+        <c:scaling>
+          <c:orientation val="minMax"/>
+        </c:scaling>
+        <c:delete val="0"/>
+        <c:axPos val="b"/>
+        <c:numFmt formatCode="General" sourceLinked="0"/>
+        <c:majorTickMark val="out"/>
+        <c:minorTickMark val="none"/>
+        <c:tickLblPos val="nextTo"/>
+        <c:crossAx val="99094336"/>
+        <c:crosses val="autoZero"/>
+        <c:auto val="1"/>
+        <c:lblAlgn val="ctr"/>
+        <c:lblOffset val="100"/>
+        <c:noMultiLvlLbl val="0"/>
+      </c:catAx>
+      <c:valAx>
+        <c:axId val="99094336"/>
+        <c:scaling>
+          <c:orientation val="minMax"/>
+          <c:max val="1"/>
+          <c:min val="0"/>
+        </c:scaling>
+        <c:delete val="0"/>
+        <c:axPos val="l"/>
+        <c:majorGridlines/>
+        <c:numFmt formatCode="0%" sourceLinked="1"/>
+        <c:majorTickMark val="out"/>
+        <c:minorTickMark val="none"/>
+        <c:tickLblPos val="nextTo"/>
+        <c:crossAx val="99093776"/>
+        <c:crosses val="autoZero"/>
+        <c:crossBetween val="between"/>
+      </c:valAx>
+    </c:plotArea>
     <c:plotVisOnly val="1"/>
     <c:dispBlanksAs val="gap"/>
     <c:showDLblsOverMax val="0"/>
@@ -987,7 +985,6 @@
           </a:p>
         </c:rich>
       </c:tx>
-      <c:layout/>
       <c:overlay val="0"/>
     </c:title>
     <c:autoTitleDeleted val="0"/>
@@ -1051,11 +1048,11 @@
           <c:showBubbleSize val="0"/>
         </c:dLbls>
         <c:gapWidth val="150"/>
-        <c:axId val="183349968"/>
-        <c:axId val="183350528"/>
+        <c:axId val="98854832"/>
+        <c:axId val="98855392"/>
       </c:barChart>
       <c:catAx>
-        <c:axId val="183349968"/>
+        <c:axId val="98854832"/>
         <c:scaling>
           <c:orientation val="minMax"/>
         </c:scaling>
@@ -1065,7 +1062,7 @@
         <c:majorTickMark val="none"/>
         <c:minorTickMark val="none"/>
         <c:tickLblPos val="nextTo"/>
-        <c:crossAx val="183350528"/>
+        <c:crossAx val="98855392"/>
         <c:crosses val="autoZero"/>
         <c:auto val="1"/>
         <c:lblAlgn val="ctr"/>
@@ -1073,7 +1070,7 @@
         <c:noMultiLvlLbl val="0"/>
       </c:catAx>
       <c:valAx>
-        <c:axId val="183350528"/>
+        <c:axId val="98855392"/>
         <c:scaling>
           <c:orientation val="minMax"/>
           <c:max val="1"/>
@@ -1085,7 +1082,7 @@
         <c:majorTickMark val="none"/>
         <c:minorTickMark val="none"/>
         <c:tickLblPos val="nextTo"/>
-        <c:crossAx val="183349968"/>
+        <c:crossAx val="98854832"/>
         <c:crosses val="autoZero"/>
         <c:crossBetween val="between"/>
       </c:valAx>
@@ -1136,7 +1133,6 @@
           </a:p>
         </c:rich>
       </c:tx>
-      <c:layout/>
       <c:overlay val="0"/>
     </c:title>
     <c:autoTitleDeleted val="0"/>
@@ -1200,11 +1196,11 @@
           <c:showBubbleSize val="0"/>
         </c:dLbls>
         <c:gapWidth val="150"/>
-        <c:axId val="183353328"/>
-        <c:axId val="183512976"/>
+        <c:axId val="98949040"/>
+        <c:axId val="98949600"/>
       </c:barChart>
       <c:catAx>
-        <c:axId val="183353328"/>
+        <c:axId val="98949040"/>
         <c:scaling>
           <c:orientation val="minMax"/>
         </c:scaling>
@@ -1214,7 +1210,7 @@
         <c:majorTickMark val="none"/>
         <c:minorTickMark val="none"/>
         <c:tickLblPos val="nextTo"/>
-        <c:crossAx val="183512976"/>
+        <c:crossAx val="98949600"/>
         <c:crosses val="autoZero"/>
         <c:auto val="1"/>
         <c:lblAlgn val="ctr"/>
@@ -1222,7 +1218,7 @@
         <c:noMultiLvlLbl val="0"/>
       </c:catAx>
       <c:valAx>
-        <c:axId val="183512976"/>
+        <c:axId val="98949600"/>
         <c:scaling>
           <c:orientation val="minMax"/>
           <c:max val="1"/>
@@ -1234,7 +1230,7 @@
         <c:majorTickMark val="none"/>
         <c:minorTickMark val="none"/>
         <c:tickLblPos val="nextTo"/>
-        <c:crossAx val="183353328"/>
+        <c:crossAx val="98949040"/>
         <c:crosses val="autoZero"/>
         <c:crossBetween val="between"/>
       </c:valAx>
@@ -1285,7 +1281,6 @@
           </a:p>
         </c:rich>
       </c:tx>
-      <c:layout/>
       <c:overlay val="0"/>
     </c:title>
     <c:autoTitleDeleted val="0"/>
@@ -1355,11 +1350,11 @@
           <c:showBubbleSize val="0"/>
         </c:dLbls>
         <c:gapWidth val="150"/>
-        <c:axId val="183515776"/>
-        <c:axId val="183516336"/>
+        <c:axId val="98952400"/>
+        <c:axId val="99031712"/>
       </c:barChart>
       <c:catAx>
-        <c:axId val="183515776"/>
+        <c:axId val="98952400"/>
         <c:scaling>
           <c:orientation val="minMax"/>
         </c:scaling>
@@ -1369,7 +1364,7 @@
         <c:majorTickMark val="none"/>
         <c:minorTickMark val="none"/>
         <c:tickLblPos val="nextTo"/>
-        <c:crossAx val="183516336"/>
+        <c:crossAx val="99031712"/>
         <c:crosses val="autoZero"/>
         <c:auto val="1"/>
         <c:lblAlgn val="ctr"/>
@@ -1377,7 +1372,7 @@
         <c:noMultiLvlLbl val="0"/>
       </c:catAx>
       <c:valAx>
-        <c:axId val="183516336"/>
+        <c:axId val="99031712"/>
         <c:scaling>
           <c:orientation val="minMax"/>
           <c:max val="1"/>
@@ -1389,7 +1384,7 @@
         <c:majorTickMark val="none"/>
         <c:minorTickMark val="none"/>
         <c:tickLblPos val="nextTo"/>
-        <c:crossAx val="183515776"/>
+        <c:crossAx val="98952400"/>
         <c:crosses val="autoZero"/>
         <c:crossBetween val="between"/>
       </c:valAx>
@@ -1440,7 +1435,6 @@
           </a:p>
         </c:rich>
       </c:tx>
-      <c:layout/>
       <c:overlay val="0"/>
     </c:title>
     <c:autoTitleDeleted val="0"/>
@@ -1504,11 +1498,11 @@
           <c:showBubbleSize val="0"/>
         </c:dLbls>
         <c:gapWidth val="150"/>
-        <c:axId val="183130624"/>
-        <c:axId val="183131184"/>
+        <c:axId val="99034512"/>
+        <c:axId val="99035072"/>
       </c:barChart>
       <c:catAx>
-        <c:axId val="183130624"/>
+        <c:axId val="99034512"/>
         <c:scaling>
           <c:orientation val="minMax"/>
         </c:scaling>
@@ -1518,7 +1512,7 @@
         <c:majorTickMark val="none"/>
         <c:minorTickMark val="none"/>
         <c:tickLblPos val="nextTo"/>
-        <c:crossAx val="183131184"/>
+        <c:crossAx val="99035072"/>
         <c:crosses val="autoZero"/>
         <c:auto val="1"/>
         <c:lblAlgn val="ctr"/>
@@ -1526,7 +1520,7 @@
         <c:noMultiLvlLbl val="0"/>
       </c:catAx>
       <c:valAx>
-        <c:axId val="183131184"/>
+        <c:axId val="99035072"/>
         <c:scaling>
           <c:orientation val="minMax"/>
         </c:scaling>
@@ -1537,7 +1531,7 @@
         <c:majorTickMark val="none"/>
         <c:minorTickMark val="none"/>
         <c:tickLblPos val="nextTo"/>
-        <c:crossAx val="183130624"/>
+        <c:crossAx val="99034512"/>
         <c:crosses val="autoZero"/>
         <c:crossBetween val="between"/>
       </c:valAx>
@@ -1556,6 +1550,440 @@
     <c:autoUpdate val="0"/>
   </c:externalData>
 </c:chartSpace>
+</file>
+
+<file path=ppt/notesMasters/notesMaster1.xml><?xml version="1.0" encoding="utf-8"?>
+<p:notesMaster xmlns:a="http://schemas.openxmlformats.org/drawingml/2006/main" xmlns:r="http://schemas.openxmlformats.org/officeDocument/2006/relationships" xmlns:p="http://schemas.openxmlformats.org/presentationml/2006/main">
+  <p:cSld>
+    <p:bg>
+      <p:bgRef idx="1001">
+        <a:schemeClr val="bg1"/>
+      </p:bgRef>
+    </p:bg>
+    <p:spTree>
+      <p:nvGrpSpPr>
+        <p:cNvPr id="1" name=""/>
+        <p:cNvGrpSpPr/>
+        <p:nvPr/>
+      </p:nvGrpSpPr>
+      <p:grpSpPr>
+        <a:xfrm>
+          <a:off x="0" y="0"/>
+          <a:ext cx="0" cy="0"/>
+          <a:chOff x="0" y="0"/>
+          <a:chExt cx="0" cy="0"/>
+        </a:xfrm>
+      </p:grpSpPr>
+      <p:sp>
+        <p:nvSpPr>
+          <p:cNvPr id="2" name="Marcador de encabezado 1"/>
+          <p:cNvSpPr>
+            <a:spLocks noGrp="1"/>
+          </p:cNvSpPr>
+          <p:nvPr>
+            <p:ph type="hdr" sz="quarter"/>
+          </p:nvPr>
+        </p:nvSpPr>
+        <p:spPr>
+          <a:xfrm>
+            <a:off x="0" y="0"/>
+            <a:ext cx="3368675" cy="504825"/>
+          </a:xfrm>
+          <a:prstGeom prst="rect">
+            <a:avLst/>
+          </a:prstGeom>
+        </p:spPr>
+        <p:txBody>
+          <a:bodyPr vert="horz" lIns="91440" tIns="45720" rIns="91440" bIns="45720" rtlCol="0"/>
+          <a:lstStyle>
+            <a:lvl1pPr algn="l">
+              <a:defRPr sz="1200"/>
+            </a:lvl1pPr>
+          </a:lstStyle>
+          <a:p>
+            <a:endParaRPr lang="es-MX"/>
+          </a:p>
+        </p:txBody>
+      </p:sp>
+      <p:sp>
+        <p:nvSpPr>
+          <p:cNvPr id="3" name="Marcador de fecha 2"/>
+          <p:cNvSpPr>
+            <a:spLocks noGrp="1"/>
+          </p:cNvSpPr>
+          <p:nvPr>
+            <p:ph type="dt" idx="1"/>
+          </p:nvPr>
+        </p:nvSpPr>
+        <p:spPr>
+          <a:xfrm>
+            <a:off x="4402138" y="0"/>
+            <a:ext cx="3368675" cy="504825"/>
+          </a:xfrm>
+          <a:prstGeom prst="rect">
+            <a:avLst/>
+          </a:prstGeom>
+        </p:spPr>
+        <p:txBody>
+          <a:bodyPr vert="horz" lIns="91440" tIns="45720" rIns="91440" bIns="45720" rtlCol="0"/>
+          <a:lstStyle>
+            <a:lvl1pPr algn="r">
+              <a:defRPr sz="1200"/>
+            </a:lvl1pPr>
+          </a:lstStyle>
+          <a:p>
+            <a:fld id="{D0A3BC85-D3F0-4F0F-BA73-A3809783C8F7}" type="datetimeFigureOut">
+              <a:rPr lang="es-MX" smtClean="0"/>
+              <a:t>15/06/2015</a:t>
+            </a:fld>
+            <a:endParaRPr lang="es-MX"/>
+          </a:p>
+        </p:txBody>
+      </p:sp>
+      <p:sp>
+        <p:nvSpPr>
+          <p:cNvPr id="4" name="Marcador de imagen de diapositiva 3"/>
+          <p:cNvSpPr>
+            <a:spLocks noGrp="1" noRot="1" noChangeAspect="1"/>
+          </p:cNvSpPr>
+          <p:nvPr>
+            <p:ph type="sldImg" idx="2"/>
+          </p:nvPr>
+        </p:nvSpPr>
+        <p:spPr>
+          <a:xfrm>
+            <a:off x="1624013" y="1257300"/>
+            <a:ext cx="4524375" cy="3394075"/>
+          </a:xfrm>
+          <a:prstGeom prst="rect">
+            <a:avLst/>
+          </a:prstGeom>
+          <a:noFill/>
+          <a:ln w="12700">
+            <a:solidFill>
+              <a:prstClr val="black"/>
+            </a:solidFill>
+          </a:ln>
+        </p:spPr>
+        <p:txBody>
+          <a:bodyPr vert="horz" lIns="91440" tIns="45720" rIns="91440" bIns="45720" rtlCol="0" anchor="ctr"/>
+          <a:lstStyle/>
+          <a:p>
+            <a:endParaRPr lang="es-MX"/>
+          </a:p>
+        </p:txBody>
+      </p:sp>
+      <p:sp>
+        <p:nvSpPr>
+          <p:cNvPr id="5" name="Marcador de notas 4"/>
+          <p:cNvSpPr>
+            <a:spLocks noGrp="1"/>
+          </p:cNvSpPr>
+          <p:nvPr>
+            <p:ph type="body" sz="quarter" idx="3"/>
+          </p:nvPr>
+        </p:nvSpPr>
+        <p:spPr>
+          <a:xfrm>
+            <a:off x="777875" y="4840288"/>
+            <a:ext cx="6216650" cy="3960812"/>
+          </a:xfrm>
+          <a:prstGeom prst="rect">
+            <a:avLst/>
+          </a:prstGeom>
+        </p:spPr>
+        <p:txBody>
+          <a:bodyPr vert="horz" lIns="91440" tIns="45720" rIns="91440" bIns="45720" rtlCol="0"/>
+          <a:lstStyle/>
+          <a:p>
+            <a:pPr lvl="0"/>
+            <a:r>
+              <a:rPr lang="es-ES" smtClean="0"/>
+              <a:t>Haga clic para modificar el estilo de texto del patrón</a:t>
+            </a:r>
+          </a:p>
+          <a:p>
+            <a:pPr lvl="1"/>
+            <a:r>
+              <a:rPr lang="es-ES" smtClean="0"/>
+              <a:t>Segundo nivel</a:t>
+            </a:r>
+          </a:p>
+          <a:p>
+            <a:pPr lvl="2"/>
+            <a:r>
+              <a:rPr lang="es-ES" smtClean="0"/>
+              <a:t>Tercer nivel</a:t>
+            </a:r>
+          </a:p>
+          <a:p>
+            <a:pPr lvl="3"/>
+            <a:r>
+              <a:rPr lang="es-ES" smtClean="0"/>
+              <a:t>Cuarto nivel</a:t>
+            </a:r>
+          </a:p>
+          <a:p>
+            <a:pPr lvl="4"/>
+            <a:r>
+              <a:rPr lang="es-ES" smtClean="0"/>
+              <a:t>Quinto nivel</a:t>
+            </a:r>
+            <a:endParaRPr lang="es-MX"/>
+          </a:p>
+        </p:txBody>
+      </p:sp>
+      <p:sp>
+        <p:nvSpPr>
+          <p:cNvPr id="6" name="Marcador de pie de página 5"/>
+          <p:cNvSpPr>
+            <a:spLocks noGrp="1"/>
+          </p:cNvSpPr>
+          <p:nvPr>
+            <p:ph type="ftr" sz="quarter" idx="4"/>
+          </p:nvPr>
+        </p:nvSpPr>
+        <p:spPr>
+          <a:xfrm>
+            <a:off x="0" y="9553575"/>
+            <a:ext cx="3368675" cy="504825"/>
+          </a:xfrm>
+          <a:prstGeom prst="rect">
+            <a:avLst/>
+          </a:prstGeom>
+        </p:spPr>
+        <p:txBody>
+          <a:bodyPr vert="horz" lIns="91440" tIns="45720" rIns="91440" bIns="45720" rtlCol="0" anchor="b"/>
+          <a:lstStyle>
+            <a:lvl1pPr algn="l">
+              <a:defRPr sz="1200"/>
+            </a:lvl1pPr>
+          </a:lstStyle>
+          <a:p>
+            <a:endParaRPr lang="es-MX"/>
+          </a:p>
+        </p:txBody>
+      </p:sp>
+      <p:sp>
+        <p:nvSpPr>
+          <p:cNvPr id="7" name="Marcador de número de diapositiva 6"/>
+          <p:cNvSpPr>
+            <a:spLocks noGrp="1"/>
+          </p:cNvSpPr>
+          <p:nvPr>
+            <p:ph type="sldNum" sz="quarter" idx="5"/>
+          </p:nvPr>
+        </p:nvSpPr>
+        <p:spPr>
+          <a:xfrm>
+            <a:off x="4402138" y="9553575"/>
+            <a:ext cx="3368675" cy="504825"/>
+          </a:xfrm>
+          <a:prstGeom prst="rect">
+            <a:avLst/>
+          </a:prstGeom>
+        </p:spPr>
+        <p:txBody>
+          <a:bodyPr vert="horz" lIns="91440" tIns="45720" rIns="91440" bIns="45720" rtlCol="0" anchor="b"/>
+          <a:lstStyle>
+            <a:lvl1pPr algn="r">
+              <a:defRPr sz="1200"/>
+            </a:lvl1pPr>
+          </a:lstStyle>
+          <a:p>
+            <a:fld id="{1E08AA08-A0AE-4D17-A2F6-35D2AE6502E1}" type="slidenum">
+              <a:rPr lang="es-MX" smtClean="0"/>
+              <a:t>‹Nº›</a:t>
+            </a:fld>
+            <a:endParaRPr lang="es-MX"/>
+          </a:p>
+        </p:txBody>
+      </p:sp>
+    </p:spTree>
+    <p:extLst>
+      <p:ext uri="{BB962C8B-B14F-4D97-AF65-F5344CB8AC3E}">
+        <p14:creationId xmlns:p14="http://schemas.microsoft.com/office/powerpoint/2010/main" val="2567669485"/>
+      </p:ext>
+    </p:extLst>
+  </p:cSld>
+  <p:clrMap bg1="lt1" tx1="dk1" bg2="lt2" tx2="dk2" accent1="accent1" accent2="accent2" accent3="accent3" accent4="accent4" accent5="accent5" accent6="accent6" hlink="hlink" folHlink="folHlink"/>
+  <p:notesStyle>
+    <a:lvl1pPr marL="0" algn="l" defTabSz="914400" rtl="0" eaLnBrk="1" latinLnBrk="0" hangingPunct="1">
+      <a:defRPr sz="1200" kern="1200">
+        <a:solidFill>
+          <a:schemeClr val="tx1"/>
+        </a:solidFill>
+        <a:latin typeface="+mn-lt"/>
+        <a:ea typeface="+mn-ea"/>
+        <a:cs typeface="+mn-cs"/>
+      </a:defRPr>
+    </a:lvl1pPr>
+    <a:lvl2pPr marL="457200" algn="l" defTabSz="914400" rtl="0" eaLnBrk="1" latinLnBrk="0" hangingPunct="1">
+      <a:defRPr sz="1200" kern="1200">
+        <a:solidFill>
+          <a:schemeClr val="tx1"/>
+        </a:solidFill>
+        <a:latin typeface="+mn-lt"/>
+        <a:ea typeface="+mn-ea"/>
+        <a:cs typeface="+mn-cs"/>
+      </a:defRPr>
+    </a:lvl2pPr>
+    <a:lvl3pPr marL="914400" algn="l" defTabSz="914400" rtl="0" eaLnBrk="1" latinLnBrk="0" hangingPunct="1">
+      <a:defRPr sz="1200" kern="1200">
+        <a:solidFill>
+          <a:schemeClr val="tx1"/>
+        </a:solidFill>
+        <a:latin typeface="+mn-lt"/>
+        <a:ea typeface="+mn-ea"/>
+        <a:cs typeface="+mn-cs"/>
+      </a:defRPr>
+    </a:lvl3pPr>
+    <a:lvl4pPr marL="1371600" algn="l" defTabSz="914400" rtl="0" eaLnBrk="1" latinLnBrk="0" hangingPunct="1">
+      <a:defRPr sz="1200" kern="1200">
+        <a:solidFill>
+          <a:schemeClr val="tx1"/>
+        </a:solidFill>
+        <a:latin typeface="+mn-lt"/>
+        <a:ea typeface="+mn-ea"/>
+        <a:cs typeface="+mn-cs"/>
+      </a:defRPr>
+    </a:lvl4pPr>
+    <a:lvl5pPr marL="1828800" algn="l" defTabSz="914400" rtl="0" eaLnBrk="1" latinLnBrk="0" hangingPunct="1">
+      <a:defRPr sz="1200" kern="1200">
+        <a:solidFill>
+          <a:schemeClr val="tx1"/>
+        </a:solidFill>
+        <a:latin typeface="+mn-lt"/>
+        <a:ea typeface="+mn-ea"/>
+        <a:cs typeface="+mn-cs"/>
+      </a:defRPr>
+    </a:lvl5pPr>
+    <a:lvl6pPr marL="2286000" algn="l" defTabSz="914400" rtl="0" eaLnBrk="1" latinLnBrk="0" hangingPunct="1">
+      <a:defRPr sz="1200" kern="1200">
+        <a:solidFill>
+          <a:schemeClr val="tx1"/>
+        </a:solidFill>
+        <a:latin typeface="+mn-lt"/>
+        <a:ea typeface="+mn-ea"/>
+        <a:cs typeface="+mn-cs"/>
+      </a:defRPr>
+    </a:lvl6pPr>
+    <a:lvl7pPr marL="2743200" algn="l" defTabSz="914400" rtl="0" eaLnBrk="1" latinLnBrk="0" hangingPunct="1">
+      <a:defRPr sz="1200" kern="1200">
+        <a:solidFill>
+          <a:schemeClr val="tx1"/>
+        </a:solidFill>
+        <a:latin typeface="+mn-lt"/>
+        <a:ea typeface="+mn-ea"/>
+        <a:cs typeface="+mn-cs"/>
+      </a:defRPr>
+    </a:lvl7pPr>
+    <a:lvl8pPr marL="3200400" algn="l" defTabSz="914400" rtl="0" eaLnBrk="1" latinLnBrk="0" hangingPunct="1">
+      <a:defRPr sz="1200" kern="1200">
+        <a:solidFill>
+          <a:schemeClr val="tx1"/>
+        </a:solidFill>
+        <a:latin typeface="+mn-lt"/>
+        <a:ea typeface="+mn-ea"/>
+        <a:cs typeface="+mn-cs"/>
+      </a:defRPr>
+    </a:lvl8pPr>
+    <a:lvl9pPr marL="3657600" algn="l" defTabSz="914400" rtl="0" eaLnBrk="1" latinLnBrk="0" hangingPunct="1">
+      <a:defRPr sz="1200" kern="1200">
+        <a:solidFill>
+          <a:schemeClr val="tx1"/>
+        </a:solidFill>
+        <a:latin typeface="+mn-lt"/>
+        <a:ea typeface="+mn-ea"/>
+        <a:cs typeface="+mn-cs"/>
+      </a:defRPr>
+    </a:lvl9pPr>
+  </p:notesStyle>
+</p:notesMaster>
+</file>
+
+<file path=ppt/notesSlides/notesSlide1.xml><?xml version="1.0" encoding="utf-8"?>
+<p:notes xmlns:a="http://schemas.openxmlformats.org/drawingml/2006/main" xmlns:r="http://schemas.openxmlformats.org/officeDocument/2006/relationships" xmlns:p="http://schemas.openxmlformats.org/presentationml/2006/main">
+  <p:cSld>
+    <p:spTree>
+      <p:nvGrpSpPr>
+        <p:cNvPr id="1" name=""/>
+        <p:cNvGrpSpPr/>
+        <p:nvPr/>
+      </p:nvGrpSpPr>
+      <p:grpSpPr>
+        <a:xfrm>
+          <a:off x="0" y="0"/>
+          <a:ext cx="0" cy="0"/>
+          <a:chOff x="0" y="0"/>
+          <a:chExt cx="0" cy="0"/>
+        </a:xfrm>
+      </p:grpSpPr>
+      <p:sp>
+        <p:nvSpPr>
+          <p:cNvPr id="2" name="Marcador de imagen de diapositiva 1"/>
+          <p:cNvSpPr>
+            <a:spLocks noGrp="1" noRot="1" noChangeAspect="1"/>
+          </p:cNvSpPr>
+          <p:nvPr>
+            <p:ph type="sldImg"/>
+          </p:nvPr>
+        </p:nvSpPr>
+        <p:spPr/>
+      </p:sp>
+      <p:sp>
+        <p:nvSpPr>
+          <p:cNvPr id="3" name="Marcador de notas 2"/>
+          <p:cNvSpPr>
+            <a:spLocks noGrp="1"/>
+          </p:cNvSpPr>
+          <p:nvPr>
+            <p:ph type="body" idx="1"/>
+          </p:nvPr>
+        </p:nvSpPr>
+        <p:spPr/>
+        <p:txBody>
+          <a:bodyPr/>
+          <a:lstStyle/>
+          <a:p>
+            <a:endParaRPr lang="es-MX" dirty="0"/>
+          </a:p>
+        </p:txBody>
+      </p:sp>
+      <p:sp>
+        <p:nvSpPr>
+          <p:cNvPr id="4" name="Marcador de número de diapositiva 3"/>
+          <p:cNvSpPr>
+            <a:spLocks noGrp="1"/>
+          </p:cNvSpPr>
+          <p:nvPr>
+            <p:ph type="sldNum" sz="quarter" idx="10"/>
+          </p:nvPr>
+        </p:nvSpPr>
+        <p:spPr/>
+        <p:txBody>
+          <a:bodyPr/>
+          <a:lstStyle/>
+          <a:p>
+            <a:fld id="{1E08AA08-A0AE-4D17-A2F6-35D2AE6502E1}" type="slidenum">
+              <a:rPr lang="es-MX" smtClean="0"/>
+              <a:t>13</a:t>
+            </a:fld>
+            <a:endParaRPr lang="es-MX"/>
+          </a:p>
+        </p:txBody>
+      </p:sp>
+    </p:spTree>
+    <p:extLst>
+      <p:ext uri="{BB962C8B-B14F-4D97-AF65-F5344CB8AC3E}">
+        <p14:creationId xmlns:p14="http://schemas.microsoft.com/office/powerpoint/2010/main" val="3159810662"/>
+      </p:ext>
+    </p:extLst>
+  </p:cSld>
+  <p:clrMapOvr>
+    <a:masterClrMapping/>
+  </p:clrMapOvr>
+</p:notes>
 </file>
 
 <file path=ppt/slideLayouts/slideLayout1.xml><?xml version="1.0" encoding="utf-8"?>
@@ -4700,21 +5128,21 @@
       </p:sp>
       <p:graphicFrame>
         <p:nvGraphicFramePr>
-          <p:cNvPr id="2" name="Tabla 1"/>
+          <p:cNvPr id="4" name="Tabla 3"/>
           <p:cNvGraphicFramePr>
             <a:graphicFrameLocks noGrp="1"/>
           </p:cNvGraphicFramePr>
           <p:nvPr>
             <p:extLst>
               <p:ext uri="{D42A27DB-BD31-4B8C-83A1-F6EECF244321}">
-                <p14:modId xmlns:p14="http://schemas.microsoft.com/office/powerpoint/2010/main" val="3258885907"/>
+                <p14:modId xmlns:p14="http://schemas.microsoft.com/office/powerpoint/2010/main" val="1537145252"/>
               </p:ext>
             </p:extLst>
           </p:nvPr>
         </p:nvGraphicFramePr>
         <p:xfrm>
-          <a:off x="648920" y="1700808"/>
-          <a:ext cx="8482861" cy="2311369"/>
+          <a:off x="457200" y="1196752"/>
+          <a:ext cx="8686802" cy="4191224"/>
         </p:xfrm>
         <a:graphic>
           <a:graphicData uri="http://schemas.openxmlformats.org/drawingml/2006/table">
@@ -4723,18 +5151,18 @@
                 <a:tableStyleId>{5C22544A-7EE6-4342-B048-85BDC9FD1C3A}</a:tableStyleId>
               </a:tblPr>
               <a:tblGrid>
-                <a:gridCol w="131287"/>
-                <a:gridCol w="1703561"/>
-                <a:gridCol w="432048"/>
-                <a:gridCol w="720080"/>
-                <a:gridCol w="576064"/>
-                <a:gridCol w="576064"/>
-                <a:gridCol w="1512168"/>
-                <a:gridCol w="1679462"/>
-                <a:gridCol w="696802"/>
-                <a:gridCol w="455325"/>
+                <a:gridCol w="135335"/>
+                <a:gridCol w="1581725"/>
+                <a:gridCol w="634382"/>
+                <a:gridCol w="634382"/>
+                <a:gridCol w="634382"/>
+                <a:gridCol w="634382"/>
+                <a:gridCol w="1581725"/>
+                <a:gridCol w="1581725"/>
+                <a:gridCol w="634382"/>
+                <a:gridCol w="634382"/>
               </a:tblGrid>
-              <a:tr h="360040">
+              <a:tr h="228114">
                 <a:tc>
                   <a:txBody>
                     <a:bodyPr/>
@@ -4788,33 +5216,10 @@
                     <a:p>
                       <a:pPr algn="ctr" fontAlgn="ctr"/>
                       <a:r>
-                        <a:rPr lang="es-MX" sz="700" u="none" strike="noStrike" dirty="0">
+                        <a:rPr lang="es-MX" sz="700" u="none" strike="noStrike">
                           <a:effectLst/>
                         </a:rPr>
                         <a:t>IMPACTO</a:t>
-                      </a:r>
-                      <a:endParaRPr lang="es-MX" sz="700" b="1" i="0" u="none" strike="noStrike" dirty="0">
-                        <a:solidFill>
-                          <a:srgbClr val="000000"/>
-                        </a:solidFill>
-                        <a:effectLst/>
-                        <a:latin typeface="Calibri" panose="020F0502020204030204" pitchFamily="34" charset="0"/>
-                      </a:endParaRPr>
-                    </a:p>
-                  </a:txBody>
-                  <a:tcPr marL="0" marR="0" marT="0" marB="0" anchor="ctr"/>
-                </a:tc>
-                <a:tc>
-                  <a:txBody>
-                    <a:bodyPr/>
-                    <a:lstStyle/>
-                    <a:p>
-                      <a:pPr algn="ctr" fontAlgn="ctr"/>
-                      <a:r>
-                        <a:rPr lang="es-MX" sz="700" u="none" strike="noStrike">
-                          <a:effectLst/>
-                        </a:rPr>
-                        <a:t>PROBABILIDAD</a:t>
                       </a:r>
                       <a:endParaRPr lang="es-MX" sz="700" b="1" i="0" u="none" strike="noStrike">
                         <a:solidFill>
@@ -4837,7 +5242,7 @@
                         <a:rPr lang="es-MX" sz="700" u="none" strike="noStrike">
                           <a:effectLst/>
                         </a:rPr>
-                        <a:t>EXPOSICIÓN</a:t>
+                        <a:t>PROBABILIDAD</a:t>
                       </a:r>
                       <a:endParaRPr lang="es-MX" sz="700" b="1" i="0" u="none" strike="noStrike">
                         <a:solidFill>
@@ -4860,7 +5265,7 @@
                         <a:rPr lang="es-MX" sz="700" u="none" strike="noStrike">
                           <a:effectLst/>
                         </a:rPr>
-                        <a:t>PRIORIDAD</a:t>
+                        <a:t>EXPOSICIÓN</a:t>
                       </a:r>
                       <a:endParaRPr lang="es-MX" sz="700" b="1" i="0" u="none" strike="noStrike">
                         <a:solidFill>
@@ -4883,7 +5288,7 @@
                         <a:rPr lang="es-MX" sz="700" u="none" strike="noStrike">
                           <a:effectLst/>
                         </a:rPr>
-                        <a:t>PLAN DE MITIGACIÓN</a:t>
+                        <a:t>PRIORIDAD</a:t>
                       </a:r>
                       <a:endParaRPr lang="es-MX" sz="700" b="1" i="0" u="none" strike="noStrike">
                         <a:solidFill>
@@ -4906,7 +5311,7 @@
                         <a:rPr lang="es-MX" sz="700" u="none" strike="noStrike">
                           <a:effectLst/>
                         </a:rPr>
-                        <a:t>PLAN DE CONTINGENCIA</a:t>
+                        <a:t>PLAN DE MITIGACIÓN</a:t>
                       </a:r>
                       <a:endParaRPr lang="es-MX" sz="700" b="1" i="0" u="none" strike="noStrike">
                         <a:solidFill>
@@ -4929,7 +5334,7 @@
                         <a:rPr lang="es-MX" sz="700" u="none" strike="noStrike">
                           <a:effectLst/>
                         </a:rPr>
-                        <a:t>RESPONSABLE</a:t>
+                        <a:t>PLAN DE CONTINGENCIA</a:t>
                       </a:r>
                       <a:endParaRPr lang="es-MX" sz="700" b="1" i="0" u="none" strike="noStrike">
                         <a:solidFill>
@@ -4952,7 +5357,7 @@
                         <a:rPr lang="es-MX" sz="700" u="none" strike="noStrike">
                           <a:effectLst/>
                         </a:rPr>
-                        <a:t>STATUS</a:t>
+                        <a:t>RESPONSABLE</a:t>
                       </a:r>
                       <a:endParaRPr lang="es-MX" sz="700" b="1" i="0" u="none" strike="noStrike">
                         <a:solidFill>
@@ -4965,8 +5370,31 @@
                   </a:txBody>
                   <a:tcPr marL="0" marR="0" marT="0" marB="0" anchor="ctr"/>
                 </a:tc>
+                <a:tc>
+                  <a:txBody>
+                    <a:bodyPr/>
+                    <a:lstStyle/>
+                    <a:p>
+                      <a:pPr algn="ctr" fontAlgn="ctr"/>
+                      <a:r>
+                        <a:rPr lang="es-MX" sz="700" u="none" strike="noStrike">
+                          <a:effectLst/>
+                        </a:rPr>
+                        <a:t>STATUS</a:t>
+                      </a:r>
+                      <a:endParaRPr lang="es-MX" sz="700" b="1" i="0" u="none" strike="noStrike">
+                        <a:solidFill>
+                          <a:srgbClr val="000000"/>
+                        </a:solidFill>
+                        <a:effectLst/>
+                        <a:latin typeface="Calibri" panose="020F0502020204030204" pitchFamily="34" charset="0"/>
+                      </a:endParaRPr>
+                    </a:p>
+                  </a:txBody>
+                  <a:tcPr marL="0" marR="0" marT="0" marB="0" anchor="ctr"/>
+                </a:tc>
               </a:tr>
-              <a:tr h="1170797">
+              <a:tr h="753959">
                 <a:tc>
                   <a:txBody>
                     <a:bodyPr/>
@@ -5195,7 +5623,7 @@
                         <a:rPr lang="es-MX" sz="700" u="none" strike="noStrike">
                           <a:effectLst/>
                         </a:rPr>
-                        <a:t>Abierto</a:t>
+                        <a:t>Mitigado</a:t>
                       </a:r>
                       <a:endParaRPr lang="es-MX" sz="700" b="0" i="0" u="none" strike="noStrike">
                         <a:solidFill>
@@ -5209,7 +5637,7 @@
                   <a:tcPr marL="0" marR="0" marT="0" marB="0" anchor="ctr"/>
                 </a:tc>
               </a:tr>
-              <a:tr h="780532">
+              <a:tr h="570287">
                 <a:tc>
                   <a:txBody>
                     <a:bodyPr/>
@@ -5424,6 +5852,1398 @@
                     <a:p>
                       <a:pPr algn="ctr" fontAlgn="ctr"/>
                       <a:r>
+                        <a:rPr lang="es-MX" sz="700" u="none" strike="noStrike">
+                          <a:effectLst/>
+                        </a:rPr>
+                        <a:t>Mitigado</a:t>
+                      </a:r>
+                      <a:endParaRPr lang="es-MX" sz="700" b="0" i="0" u="none" strike="noStrike">
+                        <a:solidFill>
+                          <a:srgbClr val="000000"/>
+                        </a:solidFill>
+                        <a:effectLst/>
+                        <a:latin typeface="Calibri" panose="020F0502020204030204" pitchFamily="34" charset="0"/>
+                      </a:endParaRPr>
+                    </a:p>
+                  </a:txBody>
+                  <a:tcPr marL="0" marR="0" marT="0" marB="0" anchor="ctr"/>
+                </a:tc>
+              </a:tr>
+              <a:tr h="376981">
+                <a:tc>
+                  <a:txBody>
+                    <a:bodyPr/>
+                    <a:lstStyle/>
+                    <a:p>
+                      <a:pPr algn="ctr" fontAlgn="ctr"/>
+                      <a:r>
+                        <a:rPr lang="es-MX" sz="700" u="none" strike="noStrike">
+                          <a:effectLst/>
+                        </a:rPr>
+                        <a:t>3</a:t>
+                      </a:r>
+                      <a:endParaRPr lang="es-MX" sz="700" b="0" i="0" u="none" strike="noStrike">
+                        <a:solidFill>
+                          <a:srgbClr val="000000"/>
+                        </a:solidFill>
+                        <a:effectLst/>
+                        <a:latin typeface="Calibri" panose="020F0502020204030204" pitchFamily="34" charset="0"/>
+                      </a:endParaRPr>
+                    </a:p>
+                  </a:txBody>
+                  <a:tcPr marL="0" marR="0" marT="0" marB="0" anchor="ctr"/>
+                </a:tc>
+                <a:tc>
+                  <a:txBody>
+                    <a:bodyPr/>
+                    <a:lstStyle/>
+                    <a:p>
+                      <a:pPr algn="l" fontAlgn="t"/>
+                      <a:r>
+                        <a:rPr lang="es-ES" sz="700" u="none" strike="noStrike">
+                          <a:effectLst/>
+                        </a:rPr>
+                        <a:t>Perdida de Servidor por falla en el equipo o siniestro natural</a:t>
+                      </a:r>
+                      <a:endParaRPr lang="es-ES" sz="700" b="0" i="0" u="none" strike="noStrike">
+                        <a:solidFill>
+                          <a:srgbClr val="000000"/>
+                        </a:solidFill>
+                        <a:effectLst/>
+                        <a:latin typeface="Calibri" panose="020F0502020204030204" pitchFamily="34" charset="0"/>
+                      </a:endParaRPr>
+                    </a:p>
+                  </a:txBody>
+                  <a:tcPr marL="0" marR="0" marT="0" marB="0"/>
+                </a:tc>
+                <a:tc>
+                  <a:txBody>
+                    <a:bodyPr/>
+                    <a:lstStyle/>
+                    <a:p>
+                      <a:pPr algn="ctr" fontAlgn="ctr"/>
+                      <a:r>
+                        <a:rPr lang="es-MX" sz="700" u="none" strike="noStrike">
+                          <a:effectLst/>
+                        </a:rPr>
+                        <a:t>5</a:t>
+                      </a:r>
+                      <a:endParaRPr lang="es-MX" sz="700" b="0" i="0" u="none" strike="noStrike">
+                        <a:solidFill>
+                          <a:srgbClr val="000000"/>
+                        </a:solidFill>
+                        <a:effectLst/>
+                        <a:latin typeface="Calibri" panose="020F0502020204030204" pitchFamily="34" charset="0"/>
+                      </a:endParaRPr>
+                    </a:p>
+                  </a:txBody>
+                  <a:tcPr marL="0" marR="0" marT="0" marB="0" anchor="ctr"/>
+                </a:tc>
+                <a:tc>
+                  <a:txBody>
+                    <a:bodyPr/>
+                    <a:lstStyle/>
+                    <a:p>
+                      <a:pPr algn="ctr" fontAlgn="ctr"/>
+                      <a:r>
+                        <a:rPr lang="es-MX" sz="700" u="none" strike="noStrike">
+                          <a:effectLst/>
+                        </a:rPr>
+                        <a:t>20%</a:t>
+                      </a:r>
+                      <a:endParaRPr lang="es-MX" sz="700" b="0" i="0" u="none" strike="noStrike">
+                        <a:solidFill>
+                          <a:srgbClr val="000000"/>
+                        </a:solidFill>
+                        <a:effectLst/>
+                        <a:latin typeface="Calibri" panose="020F0502020204030204" pitchFamily="34" charset="0"/>
+                      </a:endParaRPr>
+                    </a:p>
+                  </a:txBody>
+                  <a:tcPr marL="0" marR="0" marT="0" marB="0" anchor="ctr"/>
+                </a:tc>
+                <a:tc>
+                  <a:txBody>
+                    <a:bodyPr/>
+                    <a:lstStyle/>
+                    <a:p>
+                      <a:pPr algn="ctr" fontAlgn="ctr"/>
+                      <a:r>
+                        <a:rPr lang="es-MX" sz="700" u="none" strike="noStrike">
+                          <a:effectLst/>
+                        </a:rPr>
+                        <a:t>1</a:t>
+                      </a:r>
+                      <a:endParaRPr lang="es-MX" sz="700" b="0" i="0" u="none" strike="noStrike">
+                        <a:solidFill>
+                          <a:srgbClr val="000000"/>
+                        </a:solidFill>
+                        <a:effectLst/>
+                        <a:latin typeface="Calibri" panose="020F0502020204030204" pitchFamily="34" charset="0"/>
+                      </a:endParaRPr>
+                    </a:p>
+                  </a:txBody>
+                  <a:tcPr marL="0" marR="0" marT="0" marB="0" anchor="ctr"/>
+                </a:tc>
+                <a:tc>
+                  <a:txBody>
+                    <a:bodyPr/>
+                    <a:lstStyle/>
+                    <a:p>
+                      <a:pPr algn="ctr" fontAlgn="ctr"/>
+                      <a:r>
+                        <a:rPr lang="es-MX" sz="700" u="none" strike="noStrike">
+                          <a:effectLst/>
+                        </a:rPr>
+                        <a:t>1</a:t>
+                      </a:r>
+                      <a:endParaRPr lang="es-MX" sz="700" b="0" i="0" u="none" strike="noStrike">
+                        <a:solidFill>
+                          <a:srgbClr val="000000"/>
+                        </a:solidFill>
+                        <a:effectLst/>
+                        <a:latin typeface="Calibri" panose="020F0502020204030204" pitchFamily="34" charset="0"/>
+                      </a:endParaRPr>
+                    </a:p>
+                  </a:txBody>
+                  <a:tcPr marL="0" marR="0" marT="0" marB="0" anchor="ctr"/>
+                </a:tc>
+                <a:tc>
+                  <a:txBody>
+                    <a:bodyPr/>
+                    <a:lstStyle/>
+                    <a:p>
+                      <a:pPr algn="l" fontAlgn="t"/>
+                      <a:r>
+                        <a:rPr lang="es-ES" sz="700" u="none" strike="noStrike">
+                          <a:effectLst/>
+                        </a:rPr>
+                        <a:t>Generar respaldos preventivos con toda la informacion en un lugar diferente al ordenador </a:t>
+                      </a:r>
+                      <a:endParaRPr lang="es-ES" sz="700" b="0" i="0" u="none" strike="noStrike">
+                        <a:solidFill>
+                          <a:srgbClr val="000000"/>
+                        </a:solidFill>
+                        <a:effectLst/>
+                        <a:latin typeface="Calibri" panose="020F0502020204030204" pitchFamily="34" charset="0"/>
+                      </a:endParaRPr>
+                    </a:p>
+                  </a:txBody>
+                  <a:tcPr marL="0" marR="0" marT="0" marB="0"/>
+                </a:tc>
+                <a:tc>
+                  <a:txBody>
+                    <a:bodyPr/>
+                    <a:lstStyle/>
+                    <a:p>
+                      <a:pPr algn="l" fontAlgn="t"/>
+                      <a:r>
+                        <a:rPr lang="es-ES" sz="700" u="none" strike="noStrike">
+                          <a:effectLst/>
+                        </a:rPr>
+                        <a:t>Reinstalar servicio en un servidor distinto</a:t>
+                      </a:r>
+                      <a:endParaRPr lang="es-ES" sz="700" b="0" i="0" u="none" strike="noStrike">
+                        <a:solidFill>
+                          <a:srgbClr val="000000"/>
+                        </a:solidFill>
+                        <a:effectLst/>
+                        <a:latin typeface="Calibri" panose="020F0502020204030204" pitchFamily="34" charset="0"/>
+                      </a:endParaRPr>
+                    </a:p>
+                  </a:txBody>
+                  <a:tcPr marL="0" marR="0" marT="0" marB="0"/>
+                </a:tc>
+                <a:tc>
+                  <a:txBody>
+                    <a:bodyPr/>
+                    <a:lstStyle/>
+                    <a:p>
+                      <a:pPr algn="ctr" fontAlgn="ctr"/>
+                      <a:r>
+                        <a:rPr lang="es-MX" sz="700" u="none" strike="noStrike">
+                          <a:effectLst/>
+                        </a:rPr>
+                        <a:t>Jovanny Zepeda</a:t>
+                      </a:r>
+                      <a:endParaRPr lang="es-MX" sz="700" b="0" i="0" u="none" strike="noStrike">
+                        <a:solidFill>
+                          <a:srgbClr val="000000"/>
+                        </a:solidFill>
+                        <a:effectLst/>
+                        <a:latin typeface="Calibri" panose="020F0502020204030204" pitchFamily="34" charset="0"/>
+                      </a:endParaRPr>
+                    </a:p>
+                  </a:txBody>
+                  <a:tcPr marL="0" marR="0" marT="0" marB="0" anchor="ctr"/>
+                </a:tc>
+                <a:tc>
+                  <a:txBody>
+                    <a:bodyPr/>
+                    <a:lstStyle/>
+                    <a:p>
+                      <a:pPr algn="ctr" fontAlgn="ctr"/>
+                      <a:r>
+                        <a:rPr lang="es-MX" sz="700" u="none" strike="noStrike">
+                          <a:effectLst/>
+                        </a:rPr>
+                        <a:t>Mitigado</a:t>
+                      </a:r>
+                      <a:endParaRPr lang="es-MX" sz="700" b="0" i="0" u="none" strike="noStrike">
+                        <a:solidFill>
+                          <a:srgbClr val="000000"/>
+                        </a:solidFill>
+                        <a:effectLst/>
+                        <a:latin typeface="Calibri" panose="020F0502020204030204" pitchFamily="34" charset="0"/>
+                      </a:endParaRPr>
+                    </a:p>
+                  </a:txBody>
+                  <a:tcPr marL="0" marR="0" marT="0" marB="0" anchor="ctr"/>
+                </a:tc>
+              </a:tr>
+              <a:tr h="376981">
+                <a:tc>
+                  <a:txBody>
+                    <a:bodyPr/>
+                    <a:lstStyle/>
+                    <a:p>
+                      <a:pPr algn="ctr" fontAlgn="ctr"/>
+                      <a:r>
+                        <a:rPr lang="es-MX" sz="700" u="none" strike="noStrike">
+                          <a:effectLst/>
+                        </a:rPr>
+                        <a:t>4</a:t>
+                      </a:r>
+                      <a:endParaRPr lang="es-MX" sz="700" b="0" i="0" u="none" strike="noStrike">
+                        <a:solidFill>
+                          <a:srgbClr val="000000"/>
+                        </a:solidFill>
+                        <a:effectLst/>
+                        <a:latin typeface="Calibri" panose="020F0502020204030204" pitchFamily="34" charset="0"/>
+                      </a:endParaRPr>
+                    </a:p>
+                  </a:txBody>
+                  <a:tcPr marL="0" marR="0" marT="0" marB="0" anchor="ctr"/>
+                </a:tc>
+                <a:tc>
+                  <a:txBody>
+                    <a:bodyPr/>
+                    <a:lstStyle/>
+                    <a:p>
+                      <a:pPr algn="l" fontAlgn="t"/>
+                      <a:r>
+                        <a:rPr lang="es-ES" sz="700" u="none" strike="noStrike">
+                          <a:effectLst/>
+                        </a:rPr>
+                        <a:t>Desviaciones elevadas a causa de pocos clientes</a:t>
+                      </a:r>
+                      <a:endParaRPr lang="es-ES" sz="700" b="0" i="0" u="none" strike="noStrike">
+                        <a:solidFill>
+                          <a:srgbClr val="000000"/>
+                        </a:solidFill>
+                        <a:effectLst/>
+                        <a:latin typeface="Calibri" panose="020F0502020204030204" pitchFamily="34" charset="0"/>
+                      </a:endParaRPr>
+                    </a:p>
+                  </a:txBody>
+                  <a:tcPr marL="0" marR="0" marT="0" marB="0"/>
+                </a:tc>
+                <a:tc>
+                  <a:txBody>
+                    <a:bodyPr/>
+                    <a:lstStyle/>
+                    <a:p>
+                      <a:pPr algn="ctr" fontAlgn="ctr"/>
+                      <a:r>
+                        <a:rPr lang="es-MX" sz="700" u="none" strike="noStrike">
+                          <a:effectLst/>
+                        </a:rPr>
+                        <a:t>2</a:t>
+                      </a:r>
+                      <a:endParaRPr lang="es-MX" sz="700" b="0" i="0" u="none" strike="noStrike">
+                        <a:solidFill>
+                          <a:srgbClr val="000000"/>
+                        </a:solidFill>
+                        <a:effectLst/>
+                        <a:latin typeface="Calibri" panose="020F0502020204030204" pitchFamily="34" charset="0"/>
+                      </a:endParaRPr>
+                    </a:p>
+                  </a:txBody>
+                  <a:tcPr marL="0" marR="0" marT="0" marB="0" anchor="ctr"/>
+                </a:tc>
+                <a:tc>
+                  <a:txBody>
+                    <a:bodyPr/>
+                    <a:lstStyle/>
+                    <a:p>
+                      <a:pPr algn="ctr" fontAlgn="ctr"/>
+                      <a:r>
+                        <a:rPr lang="es-MX" sz="700" u="none" strike="noStrike">
+                          <a:effectLst/>
+                        </a:rPr>
+                        <a:t>65%</a:t>
+                      </a:r>
+                      <a:endParaRPr lang="es-MX" sz="700" b="0" i="0" u="none" strike="noStrike">
+                        <a:solidFill>
+                          <a:srgbClr val="000000"/>
+                        </a:solidFill>
+                        <a:effectLst/>
+                        <a:latin typeface="Calibri" panose="020F0502020204030204" pitchFamily="34" charset="0"/>
+                      </a:endParaRPr>
+                    </a:p>
+                  </a:txBody>
+                  <a:tcPr marL="0" marR="0" marT="0" marB="0" anchor="ctr"/>
+                </a:tc>
+                <a:tc>
+                  <a:txBody>
+                    <a:bodyPr/>
+                    <a:lstStyle/>
+                    <a:p>
+                      <a:pPr algn="ctr" fontAlgn="ctr"/>
+                      <a:r>
+                        <a:rPr lang="es-MX" sz="700" u="none" strike="noStrike">
+                          <a:effectLst/>
+                        </a:rPr>
+                        <a:t>1,3</a:t>
+                      </a:r>
+                      <a:endParaRPr lang="es-MX" sz="700" b="0" i="0" u="none" strike="noStrike">
+                        <a:solidFill>
+                          <a:srgbClr val="000000"/>
+                        </a:solidFill>
+                        <a:effectLst/>
+                        <a:latin typeface="Calibri" panose="020F0502020204030204" pitchFamily="34" charset="0"/>
+                      </a:endParaRPr>
+                    </a:p>
+                  </a:txBody>
+                  <a:tcPr marL="0" marR="0" marT="0" marB="0" anchor="ctr"/>
+                </a:tc>
+                <a:tc>
+                  <a:txBody>
+                    <a:bodyPr/>
+                    <a:lstStyle/>
+                    <a:p>
+                      <a:pPr algn="ctr" fontAlgn="ctr"/>
+                      <a:r>
+                        <a:rPr lang="es-MX" sz="700" u="none" strike="noStrike">
+                          <a:effectLst/>
+                        </a:rPr>
+                        <a:t>3</a:t>
+                      </a:r>
+                      <a:endParaRPr lang="es-MX" sz="700" b="0" i="0" u="none" strike="noStrike">
+                        <a:solidFill>
+                          <a:srgbClr val="000000"/>
+                        </a:solidFill>
+                        <a:effectLst/>
+                        <a:latin typeface="Calibri" panose="020F0502020204030204" pitchFamily="34" charset="0"/>
+                      </a:endParaRPr>
+                    </a:p>
+                  </a:txBody>
+                  <a:tcPr marL="0" marR="0" marT="0" marB="0" anchor="ctr"/>
+                </a:tc>
+                <a:tc>
+                  <a:txBody>
+                    <a:bodyPr/>
+                    <a:lstStyle/>
+                    <a:p>
+                      <a:pPr algn="l" fontAlgn="t"/>
+                      <a:r>
+                        <a:rPr lang="es-ES" sz="700" u="none" strike="noStrike">
+                          <a:effectLst/>
+                        </a:rPr>
+                        <a:t>Generar servicio adecuado para que los clientes comiencen a recomendar los servicios otorgados</a:t>
+                      </a:r>
+                      <a:endParaRPr lang="es-ES" sz="700" b="0" i="0" u="none" strike="noStrike">
+                        <a:solidFill>
+                          <a:srgbClr val="000000"/>
+                        </a:solidFill>
+                        <a:effectLst/>
+                        <a:latin typeface="Calibri" panose="020F0502020204030204" pitchFamily="34" charset="0"/>
+                      </a:endParaRPr>
+                    </a:p>
+                  </a:txBody>
+                  <a:tcPr marL="0" marR="0" marT="0" marB="0"/>
+                </a:tc>
+                <a:tc>
+                  <a:txBody>
+                    <a:bodyPr/>
+                    <a:lstStyle/>
+                    <a:p>
+                      <a:pPr algn="l" fontAlgn="t"/>
+                      <a:r>
+                        <a:rPr lang="es-ES" sz="700" u="none" strike="noStrike">
+                          <a:effectLst/>
+                        </a:rPr>
+                        <a:t>Buscar mas clientes para poder invertir mas tiempo del planeado en la ejecucion</a:t>
+                      </a:r>
+                      <a:endParaRPr lang="es-ES" sz="700" b="0" i="0" u="none" strike="noStrike">
+                        <a:solidFill>
+                          <a:srgbClr val="000000"/>
+                        </a:solidFill>
+                        <a:effectLst/>
+                        <a:latin typeface="Calibri" panose="020F0502020204030204" pitchFamily="34" charset="0"/>
+                      </a:endParaRPr>
+                    </a:p>
+                  </a:txBody>
+                  <a:tcPr marL="0" marR="0" marT="0" marB="0"/>
+                </a:tc>
+                <a:tc>
+                  <a:txBody>
+                    <a:bodyPr/>
+                    <a:lstStyle/>
+                    <a:p>
+                      <a:pPr algn="ctr" fontAlgn="ctr"/>
+                      <a:r>
+                        <a:rPr lang="es-MX" sz="700" u="none" strike="noStrike">
+                          <a:effectLst/>
+                        </a:rPr>
+                        <a:t>Fidel Reyna</a:t>
+                      </a:r>
+                      <a:endParaRPr lang="es-MX" sz="700" b="0" i="0" u="none" strike="noStrike">
+                        <a:solidFill>
+                          <a:srgbClr val="000000"/>
+                        </a:solidFill>
+                        <a:effectLst/>
+                        <a:latin typeface="Calibri" panose="020F0502020204030204" pitchFamily="34" charset="0"/>
+                      </a:endParaRPr>
+                    </a:p>
+                  </a:txBody>
+                  <a:tcPr marL="0" marR="0" marT="0" marB="0" anchor="ctr"/>
+                </a:tc>
+                <a:tc>
+                  <a:txBody>
+                    <a:bodyPr/>
+                    <a:lstStyle/>
+                    <a:p>
+                      <a:pPr algn="ctr" fontAlgn="ctr"/>
+                      <a:r>
+                        <a:rPr lang="es-MX" sz="700" u="none" strike="noStrike">
+                          <a:effectLst/>
+                        </a:rPr>
+                        <a:t>Ocurrido</a:t>
+                      </a:r>
+                      <a:endParaRPr lang="es-MX" sz="700" b="0" i="0" u="none" strike="noStrike">
+                        <a:solidFill>
+                          <a:srgbClr val="000000"/>
+                        </a:solidFill>
+                        <a:effectLst/>
+                        <a:latin typeface="Calibri" panose="020F0502020204030204" pitchFamily="34" charset="0"/>
+                      </a:endParaRPr>
+                    </a:p>
+                  </a:txBody>
+                  <a:tcPr marL="0" marR="0" marT="0" marB="0" anchor="ctr"/>
+                </a:tc>
+              </a:tr>
+              <a:tr h="628299">
+                <a:tc>
+                  <a:txBody>
+                    <a:bodyPr/>
+                    <a:lstStyle/>
+                    <a:p>
+                      <a:pPr algn="ctr" fontAlgn="ctr"/>
+                      <a:r>
+                        <a:rPr lang="es-MX" sz="700" u="none" strike="noStrike">
+                          <a:effectLst/>
+                        </a:rPr>
+                        <a:t>5</a:t>
+                      </a:r>
+                      <a:endParaRPr lang="es-MX" sz="700" b="0" i="0" u="none" strike="noStrike">
+                        <a:solidFill>
+                          <a:srgbClr val="000000"/>
+                        </a:solidFill>
+                        <a:effectLst/>
+                        <a:latin typeface="Calibri" panose="020F0502020204030204" pitchFamily="34" charset="0"/>
+                      </a:endParaRPr>
+                    </a:p>
+                  </a:txBody>
+                  <a:tcPr marL="0" marR="0" marT="0" marB="0" anchor="ctr"/>
+                </a:tc>
+                <a:tc>
+                  <a:txBody>
+                    <a:bodyPr/>
+                    <a:lstStyle/>
+                    <a:p>
+                      <a:pPr algn="l" fontAlgn="t"/>
+                      <a:r>
+                        <a:rPr lang="es-ES" sz="700" u="none" strike="noStrike">
+                          <a:effectLst/>
+                        </a:rPr>
+                        <a:t>Debido a que el servicio web en ocasiones es inestable existe la probabilidad de que el sistema utilizado de tickets sea inaccesible por algunos momentos</a:t>
+                      </a:r>
+                      <a:endParaRPr lang="es-ES" sz="700" b="0" i="0" u="none" strike="noStrike">
+                        <a:solidFill>
+                          <a:srgbClr val="000000"/>
+                        </a:solidFill>
+                        <a:effectLst/>
+                        <a:latin typeface="Calibri" panose="020F0502020204030204" pitchFamily="34" charset="0"/>
+                      </a:endParaRPr>
+                    </a:p>
+                  </a:txBody>
+                  <a:tcPr marL="0" marR="0" marT="0" marB="0"/>
+                </a:tc>
+                <a:tc>
+                  <a:txBody>
+                    <a:bodyPr/>
+                    <a:lstStyle/>
+                    <a:p>
+                      <a:pPr algn="ctr" fontAlgn="ctr"/>
+                      <a:r>
+                        <a:rPr lang="es-MX" sz="700" u="none" strike="noStrike">
+                          <a:effectLst/>
+                        </a:rPr>
+                        <a:t>2</a:t>
+                      </a:r>
+                      <a:endParaRPr lang="es-MX" sz="700" b="0" i="0" u="none" strike="noStrike">
+                        <a:solidFill>
+                          <a:srgbClr val="000000"/>
+                        </a:solidFill>
+                        <a:effectLst/>
+                        <a:latin typeface="Calibri" panose="020F0502020204030204" pitchFamily="34" charset="0"/>
+                      </a:endParaRPr>
+                    </a:p>
+                  </a:txBody>
+                  <a:tcPr marL="0" marR="0" marT="0" marB="0" anchor="ctr"/>
+                </a:tc>
+                <a:tc>
+                  <a:txBody>
+                    <a:bodyPr/>
+                    <a:lstStyle/>
+                    <a:p>
+                      <a:pPr algn="ctr" fontAlgn="ctr"/>
+                      <a:r>
+                        <a:rPr lang="es-MX" sz="700" u="none" strike="noStrike">
+                          <a:effectLst/>
+                        </a:rPr>
+                        <a:t>45%</a:t>
+                      </a:r>
+                      <a:endParaRPr lang="es-MX" sz="700" b="0" i="0" u="none" strike="noStrike">
+                        <a:solidFill>
+                          <a:srgbClr val="000000"/>
+                        </a:solidFill>
+                        <a:effectLst/>
+                        <a:latin typeface="Calibri" panose="020F0502020204030204" pitchFamily="34" charset="0"/>
+                      </a:endParaRPr>
+                    </a:p>
+                  </a:txBody>
+                  <a:tcPr marL="0" marR="0" marT="0" marB="0" anchor="ctr"/>
+                </a:tc>
+                <a:tc>
+                  <a:txBody>
+                    <a:bodyPr/>
+                    <a:lstStyle/>
+                    <a:p>
+                      <a:pPr algn="ctr" fontAlgn="ctr"/>
+                      <a:r>
+                        <a:rPr lang="es-MX" sz="700" u="none" strike="noStrike">
+                          <a:effectLst/>
+                        </a:rPr>
+                        <a:t>0,9</a:t>
+                      </a:r>
+                      <a:endParaRPr lang="es-MX" sz="700" b="0" i="0" u="none" strike="noStrike">
+                        <a:solidFill>
+                          <a:srgbClr val="000000"/>
+                        </a:solidFill>
+                        <a:effectLst/>
+                        <a:latin typeface="Calibri" panose="020F0502020204030204" pitchFamily="34" charset="0"/>
+                      </a:endParaRPr>
+                    </a:p>
+                  </a:txBody>
+                  <a:tcPr marL="0" marR="0" marT="0" marB="0" anchor="ctr"/>
+                </a:tc>
+                <a:tc>
+                  <a:txBody>
+                    <a:bodyPr/>
+                    <a:lstStyle/>
+                    <a:p>
+                      <a:pPr algn="ctr" fontAlgn="ctr"/>
+                      <a:r>
+                        <a:rPr lang="es-MX" sz="700" u="none" strike="noStrike">
+                          <a:effectLst/>
+                        </a:rPr>
+                        <a:t>2</a:t>
+                      </a:r>
+                      <a:endParaRPr lang="es-MX" sz="700" b="0" i="0" u="none" strike="noStrike">
+                        <a:solidFill>
+                          <a:srgbClr val="000000"/>
+                        </a:solidFill>
+                        <a:effectLst/>
+                        <a:latin typeface="Calibri" panose="020F0502020204030204" pitchFamily="34" charset="0"/>
+                      </a:endParaRPr>
+                    </a:p>
+                  </a:txBody>
+                  <a:tcPr marL="0" marR="0" marT="0" marB="0" anchor="ctr"/>
+                </a:tc>
+                <a:tc>
+                  <a:txBody>
+                    <a:bodyPr/>
+                    <a:lstStyle/>
+                    <a:p>
+                      <a:pPr algn="l" fontAlgn="t"/>
+                      <a:r>
+                        <a:rPr lang="es-ES" sz="700" u="none" strike="noStrike">
+                          <a:effectLst/>
+                        </a:rPr>
+                        <a:t>Generar limpiezas y mantenimintos adecuados al servicio HTTP del servidor para evitar fallas</a:t>
+                      </a:r>
+                      <a:endParaRPr lang="es-ES" sz="700" b="0" i="0" u="none" strike="noStrike">
+                        <a:solidFill>
+                          <a:srgbClr val="000000"/>
+                        </a:solidFill>
+                        <a:effectLst/>
+                        <a:latin typeface="Calibri" panose="020F0502020204030204" pitchFamily="34" charset="0"/>
+                      </a:endParaRPr>
+                    </a:p>
+                  </a:txBody>
+                  <a:tcPr marL="0" marR="0" marT="0" marB="0"/>
+                </a:tc>
+                <a:tc>
+                  <a:txBody>
+                    <a:bodyPr/>
+                    <a:lstStyle/>
+                    <a:p>
+                      <a:pPr algn="l" fontAlgn="t"/>
+                      <a:r>
+                        <a:rPr lang="es-ES" sz="700" u="none" strike="noStrike">
+                          <a:effectLst/>
+                        </a:rPr>
+                        <a:t>Generar registro temporal en herramientas secundarias y en caso de falla total migrar la informacion a la herramienta vtigger</a:t>
+                      </a:r>
+                      <a:endParaRPr lang="es-ES" sz="700" b="0" i="0" u="none" strike="noStrike">
+                        <a:solidFill>
+                          <a:srgbClr val="000000"/>
+                        </a:solidFill>
+                        <a:effectLst/>
+                        <a:latin typeface="Calibri" panose="020F0502020204030204" pitchFamily="34" charset="0"/>
+                      </a:endParaRPr>
+                    </a:p>
+                  </a:txBody>
+                  <a:tcPr marL="0" marR="0" marT="0" marB="0"/>
+                </a:tc>
+                <a:tc>
+                  <a:txBody>
+                    <a:bodyPr/>
+                    <a:lstStyle/>
+                    <a:p>
+                      <a:pPr algn="ctr" fontAlgn="ctr"/>
+                      <a:r>
+                        <a:rPr lang="es-MX" sz="700" u="none" strike="noStrike">
+                          <a:effectLst/>
+                        </a:rPr>
+                        <a:t>Jovanny Zepeda</a:t>
+                      </a:r>
+                      <a:endParaRPr lang="es-MX" sz="700" b="0" i="0" u="none" strike="noStrike">
+                        <a:solidFill>
+                          <a:srgbClr val="000000"/>
+                        </a:solidFill>
+                        <a:effectLst/>
+                        <a:latin typeface="Calibri" panose="020F0502020204030204" pitchFamily="34" charset="0"/>
+                      </a:endParaRPr>
+                    </a:p>
+                  </a:txBody>
+                  <a:tcPr marL="0" marR="0" marT="0" marB="0" anchor="ctr"/>
+                </a:tc>
+                <a:tc>
+                  <a:txBody>
+                    <a:bodyPr/>
+                    <a:lstStyle/>
+                    <a:p>
+                      <a:pPr algn="ctr" fontAlgn="ctr"/>
+                      <a:r>
+                        <a:rPr lang="es-MX" sz="700" u="none" strike="noStrike">
+                          <a:effectLst/>
+                        </a:rPr>
+                        <a:t>Mitigado</a:t>
+                      </a:r>
+                      <a:endParaRPr lang="es-MX" sz="700" b="0" i="0" u="none" strike="noStrike">
+                        <a:solidFill>
+                          <a:srgbClr val="000000"/>
+                        </a:solidFill>
+                        <a:effectLst/>
+                        <a:latin typeface="Calibri" panose="020F0502020204030204" pitchFamily="34" charset="0"/>
+                      </a:endParaRPr>
+                    </a:p>
+                  </a:txBody>
+                  <a:tcPr marL="0" marR="0" marT="0" marB="0" anchor="ctr"/>
+                </a:tc>
+              </a:tr>
+              <a:tr h="502641">
+                <a:tc>
+                  <a:txBody>
+                    <a:bodyPr/>
+                    <a:lstStyle/>
+                    <a:p>
+                      <a:pPr algn="ctr" fontAlgn="ctr"/>
+                      <a:r>
+                        <a:rPr lang="es-MX" sz="700" u="none" strike="noStrike">
+                          <a:effectLst/>
+                        </a:rPr>
+                        <a:t>6</a:t>
+                      </a:r>
+                      <a:endParaRPr lang="es-MX" sz="700" b="0" i="0" u="none" strike="noStrike">
+                        <a:solidFill>
+                          <a:srgbClr val="000000"/>
+                        </a:solidFill>
+                        <a:effectLst/>
+                        <a:latin typeface="Calibri" panose="020F0502020204030204" pitchFamily="34" charset="0"/>
+                      </a:endParaRPr>
+                    </a:p>
+                  </a:txBody>
+                  <a:tcPr marL="0" marR="0" marT="0" marB="0" anchor="ctr"/>
+                </a:tc>
+                <a:tc>
+                  <a:txBody>
+                    <a:bodyPr/>
+                    <a:lstStyle/>
+                    <a:p>
+                      <a:pPr algn="l" fontAlgn="t"/>
+                      <a:r>
+                        <a:rPr lang="es-MX" sz="700" u="none" strike="noStrike">
+                          <a:effectLst/>
+                        </a:rPr>
+                        <a:t>Perdida o falta de integrantes del equipo basico de trabajo</a:t>
+                      </a:r>
+                      <a:endParaRPr lang="es-MX" sz="700" b="0" i="0" u="none" strike="noStrike">
+                        <a:solidFill>
+                          <a:srgbClr val="000000"/>
+                        </a:solidFill>
+                        <a:effectLst/>
+                        <a:latin typeface="Calibri" panose="020F0502020204030204" pitchFamily="34" charset="0"/>
+                      </a:endParaRPr>
+                    </a:p>
+                  </a:txBody>
+                  <a:tcPr marL="0" marR="0" marT="0" marB="0"/>
+                </a:tc>
+                <a:tc>
+                  <a:txBody>
+                    <a:bodyPr/>
+                    <a:lstStyle/>
+                    <a:p>
+                      <a:pPr algn="ctr" fontAlgn="ctr"/>
+                      <a:r>
+                        <a:rPr lang="es-MX" sz="700" u="none" strike="noStrike">
+                          <a:effectLst/>
+                        </a:rPr>
+                        <a:t>4</a:t>
+                      </a:r>
+                      <a:endParaRPr lang="es-MX" sz="700" b="0" i="0" u="none" strike="noStrike">
+                        <a:solidFill>
+                          <a:srgbClr val="000000"/>
+                        </a:solidFill>
+                        <a:effectLst/>
+                        <a:latin typeface="Calibri" panose="020F0502020204030204" pitchFamily="34" charset="0"/>
+                      </a:endParaRPr>
+                    </a:p>
+                  </a:txBody>
+                  <a:tcPr marL="0" marR="0" marT="0" marB="0" anchor="ctr"/>
+                </a:tc>
+                <a:tc>
+                  <a:txBody>
+                    <a:bodyPr/>
+                    <a:lstStyle/>
+                    <a:p>
+                      <a:pPr algn="ctr" fontAlgn="ctr"/>
+                      <a:r>
+                        <a:rPr lang="es-MX" sz="700" u="none" strike="noStrike">
+                          <a:effectLst/>
+                        </a:rPr>
+                        <a:t>55%</a:t>
+                      </a:r>
+                      <a:endParaRPr lang="es-MX" sz="700" b="0" i="0" u="none" strike="noStrike">
+                        <a:solidFill>
+                          <a:srgbClr val="000000"/>
+                        </a:solidFill>
+                        <a:effectLst/>
+                        <a:latin typeface="Calibri" panose="020F0502020204030204" pitchFamily="34" charset="0"/>
+                      </a:endParaRPr>
+                    </a:p>
+                  </a:txBody>
+                  <a:tcPr marL="0" marR="0" marT="0" marB="0" anchor="ctr"/>
+                </a:tc>
+                <a:tc>
+                  <a:txBody>
+                    <a:bodyPr/>
+                    <a:lstStyle/>
+                    <a:p>
+                      <a:pPr algn="ctr" fontAlgn="ctr"/>
+                      <a:r>
+                        <a:rPr lang="es-MX" sz="700" u="none" strike="noStrike">
+                          <a:effectLst/>
+                        </a:rPr>
+                        <a:t>2,2</a:t>
+                      </a:r>
+                      <a:endParaRPr lang="es-MX" sz="700" b="0" i="0" u="none" strike="noStrike">
+                        <a:solidFill>
+                          <a:srgbClr val="000000"/>
+                        </a:solidFill>
+                        <a:effectLst/>
+                        <a:latin typeface="Calibri" panose="020F0502020204030204" pitchFamily="34" charset="0"/>
+                      </a:endParaRPr>
+                    </a:p>
+                  </a:txBody>
+                  <a:tcPr marL="0" marR="0" marT="0" marB="0" anchor="ctr"/>
+                </a:tc>
+                <a:tc>
+                  <a:txBody>
+                    <a:bodyPr/>
+                    <a:lstStyle/>
+                    <a:p>
+                      <a:pPr algn="ctr" fontAlgn="ctr"/>
+                      <a:r>
+                        <a:rPr lang="es-MX" sz="700" u="none" strike="noStrike">
+                          <a:effectLst/>
+                        </a:rPr>
+                        <a:t>4</a:t>
+                      </a:r>
+                      <a:endParaRPr lang="es-MX" sz="700" b="0" i="0" u="none" strike="noStrike">
+                        <a:solidFill>
+                          <a:srgbClr val="000000"/>
+                        </a:solidFill>
+                        <a:effectLst/>
+                        <a:latin typeface="Calibri" panose="020F0502020204030204" pitchFamily="34" charset="0"/>
+                      </a:endParaRPr>
+                    </a:p>
+                  </a:txBody>
+                  <a:tcPr marL="0" marR="0" marT="0" marB="0" anchor="ctr"/>
+                </a:tc>
+                <a:tc>
+                  <a:txBody>
+                    <a:bodyPr/>
+                    <a:lstStyle/>
+                    <a:p>
+                      <a:pPr algn="l" fontAlgn="t"/>
+                      <a:r>
+                        <a:rPr lang="es-ES" sz="700" u="none" strike="noStrike">
+                          <a:effectLst/>
+                        </a:rPr>
+                        <a:t>Capacitar a todo el personal en diversas secciones</a:t>
+                      </a:r>
+                      <a:endParaRPr lang="es-ES" sz="700" b="0" i="0" u="none" strike="noStrike">
+                        <a:solidFill>
+                          <a:srgbClr val="000000"/>
+                        </a:solidFill>
+                        <a:effectLst/>
+                        <a:latin typeface="Calibri" panose="020F0502020204030204" pitchFamily="34" charset="0"/>
+                      </a:endParaRPr>
+                    </a:p>
+                  </a:txBody>
+                  <a:tcPr marL="0" marR="0" marT="0" marB="0"/>
+                </a:tc>
+                <a:tc>
+                  <a:txBody>
+                    <a:bodyPr/>
+                    <a:lstStyle/>
+                    <a:p>
+                      <a:pPr algn="l" fontAlgn="t"/>
+                      <a:r>
+                        <a:rPr lang="es-ES" sz="700" u="none" strike="noStrike">
+                          <a:effectLst/>
+                        </a:rPr>
+                        <a:t>Dividir tareas del trabajo diario entre integrantes disponibles y en caso de ausencia definitiva contratacion de personale</a:t>
+                      </a:r>
+                      <a:endParaRPr lang="es-ES" sz="700" b="0" i="0" u="none" strike="noStrike">
+                        <a:solidFill>
+                          <a:srgbClr val="000000"/>
+                        </a:solidFill>
+                        <a:effectLst/>
+                        <a:latin typeface="Calibri" panose="020F0502020204030204" pitchFamily="34" charset="0"/>
+                      </a:endParaRPr>
+                    </a:p>
+                  </a:txBody>
+                  <a:tcPr marL="0" marR="0" marT="0" marB="0"/>
+                </a:tc>
+                <a:tc>
+                  <a:txBody>
+                    <a:bodyPr/>
+                    <a:lstStyle/>
+                    <a:p>
+                      <a:pPr algn="ctr" fontAlgn="ctr"/>
+                      <a:r>
+                        <a:rPr lang="es-MX" sz="700" u="none" strike="noStrike">
+                          <a:effectLst/>
+                        </a:rPr>
+                        <a:t>Fidel Reyna</a:t>
+                      </a:r>
+                      <a:endParaRPr lang="es-MX" sz="700" b="0" i="0" u="none" strike="noStrike">
+                        <a:solidFill>
+                          <a:srgbClr val="000000"/>
+                        </a:solidFill>
+                        <a:effectLst/>
+                        <a:latin typeface="Calibri" panose="020F0502020204030204" pitchFamily="34" charset="0"/>
+                      </a:endParaRPr>
+                    </a:p>
+                  </a:txBody>
+                  <a:tcPr marL="0" marR="0" marT="0" marB="0" anchor="ctr"/>
+                </a:tc>
+                <a:tc>
+                  <a:txBody>
+                    <a:bodyPr/>
+                    <a:lstStyle/>
+                    <a:p>
+                      <a:pPr algn="ctr" fontAlgn="ctr"/>
+                      <a:r>
+                        <a:rPr lang="es-MX" sz="700" u="none" strike="noStrike">
+                          <a:effectLst/>
+                        </a:rPr>
+                        <a:t>Mitigado</a:t>
+                      </a:r>
+                      <a:endParaRPr lang="es-MX" sz="700" b="0" i="0" u="none" strike="noStrike">
+                        <a:solidFill>
+                          <a:srgbClr val="000000"/>
+                        </a:solidFill>
+                        <a:effectLst/>
+                        <a:latin typeface="Calibri" panose="020F0502020204030204" pitchFamily="34" charset="0"/>
+                      </a:endParaRPr>
+                    </a:p>
+                  </a:txBody>
+                  <a:tcPr marL="0" marR="0" marT="0" marB="0" anchor="ctr"/>
+                </a:tc>
+              </a:tr>
+              <a:tr h="376981">
+                <a:tc>
+                  <a:txBody>
+                    <a:bodyPr/>
+                    <a:lstStyle/>
+                    <a:p>
+                      <a:pPr algn="ctr" fontAlgn="ctr"/>
+                      <a:r>
+                        <a:rPr lang="es-MX" sz="700" u="none" strike="noStrike">
+                          <a:effectLst/>
+                        </a:rPr>
+                        <a:t>7</a:t>
+                      </a:r>
+                      <a:endParaRPr lang="es-MX" sz="700" b="0" i="0" u="none" strike="noStrike">
+                        <a:solidFill>
+                          <a:srgbClr val="000000"/>
+                        </a:solidFill>
+                        <a:effectLst/>
+                        <a:latin typeface="Calibri" panose="020F0502020204030204" pitchFamily="34" charset="0"/>
+                      </a:endParaRPr>
+                    </a:p>
+                  </a:txBody>
+                  <a:tcPr marL="0" marR="0" marT="0" marB="0" anchor="ctr"/>
+                </a:tc>
+                <a:tc>
+                  <a:txBody>
+                    <a:bodyPr/>
+                    <a:lstStyle/>
+                    <a:p>
+                      <a:pPr algn="l" fontAlgn="t"/>
+                      <a:r>
+                        <a:rPr lang="es-ES" sz="700" u="none" strike="noStrike">
+                          <a:effectLst/>
+                        </a:rPr>
+                        <a:t>Desviaciones de costos y esfuerzo elevadas a causa de exceso de clientes</a:t>
+                      </a:r>
+                      <a:endParaRPr lang="es-ES" sz="700" b="0" i="0" u="none" strike="noStrike">
+                        <a:solidFill>
+                          <a:srgbClr val="000000"/>
+                        </a:solidFill>
+                        <a:effectLst/>
+                        <a:latin typeface="Calibri" panose="020F0502020204030204" pitchFamily="34" charset="0"/>
+                      </a:endParaRPr>
+                    </a:p>
+                  </a:txBody>
+                  <a:tcPr marL="0" marR="0" marT="0" marB="0"/>
+                </a:tc>
+                <a:tc>
+                  <a:txBody>
+                    <a:bodyPr/>
+                    <a:lstStyle/>
+                    <a:p>
+                      <a:pPr algn="ctr" fontAlgn="ctr"/>
+                      <a:r>
+                        <a:rPr lang="es-MX" sz="700" u="none" strike="noStrike">
+                          <a:effectLst/>
+                        </a:rPr>
+                        <a:t>3</a:t>
+                      </a:r>
+                      <a:endParaRPr lang="es-MX" sz="700" b="0" i="0" u="none" strike="noStrike">
+                        <a:solidFill>
+                          <a:srgbClr val="000000"/>
+                        </a:solidFill>
+                        <a:effectLst/>
+                        <a:latin typeface="Calibri" panose="020F0502020204030204" pitchFamily="34" charset="0"/>
+                      </a:endParaRPr>
+                    </a:p>
+                  </a:txBody>
+                  <a:tcPr marL="0" marR="0" marT="0" marB="0" anchor="ctr"/>
+                </a:tc>
+                <a:tc>
+                  <a:txBody>
+                    <a:bodyPr/>
+                    <a:lstStyle/>
+                    <a:p>
+                      <a:pPr algn="ctr" fontAlgn="ctr"/>
+                      <a:r>
+                        <a:rPr lang="es-MX" sz="700" u="none" strike="noStrike">
+                          <a:effectLst/>
+                        </a:rPr>
+                        <a:t>60%</a:t>
+                      </a:r>
+                      <a:endParaRPr lang="es-MX" sz="700" b="0" i="0" u="none" strike="noStrike">
+                        <a:solidFill>
+                          <a:srgbClr val="000000"/>
+                        </a:solidFill>
+                        <a:effectLst/>
+                        <a:latin typeface="Calibri" panose="020F0502020204030204" pitchFamily="34" charset="0"/>
+                      </a:endParaRPr>
+                    </a:p>
+                  </a:txBody>
+                  <a:tcPr marL="0" marR="0" marT="0" marB="0" anchor="ctr"/>
+                </a:tc>
+                <a:tc>
+                  <a:txBody>
+                    <a:bodyPr/>
+                    <a:lstStyle/>
+                    <a:p>
+                      <a:pPr algn="ctr" fontAlgn="ctr"/>
+                      <a:r>
+                        <a:rPr lang="es-MX" sz="700" u="none" strike="noStrike">
+                          <a:effectLst/>
+                        </a:rPr>
+                        <a:t>1,8</a:t>
+                      </a:r>
+                      <a:endParaRPr lang="es-MX" sz="700" b="0" i="0" u="none" strike="noStrike">
+                        <a:solidFill>
+                          <a:srgbClr val="000000"/>
+                        </a:solidFill>
+                        <a:effectLst/>
+                        <a:latin typeface="Calibri" panose="020F0502020204030204" pitchFamily="34" charset="0"/>
+                      </a:endParaRPr>
+                    </a:p>
+                  </a:txBody>
+                  <a:tcPr marL="0" marR="0" marT="0" marB="0" anchor="ctr"/>
+                </a:tc>
+                <a:tc>
+                  <a:txBody>
+                    <a:bodyPr/>
+                    <a:lstStyle/>
+                    <a:p>
+                      <a:pPr algn="ctr" fontAlgn="ctr"/>
+                      <a:r>
+                        <a:rPr lang="es-MX" sz="700" u="none" strike="noStrike">
+                          <a:effectLst/>
+                        </a:rPr>
+                        <a:t>4</a:t>
+                      </a:r>
+                      <a:endParaRPr lang="es-MX" sz="700" b="0" i="0" u="none" strike="noStrike">
+                        <a:solidFill>
+                          <a:srgbClr val="000000"/>
+                        </a:solidFill>
+                        <a:effectLst/>
+                        <a:latin typeface="Calibri" panose="020F0502020204030204" pitchFamily="34" charset="0"/>
+                      </a:endParaRPr>
+                    </a:p>
+                  </a:txBody>
+                  <a:tcPr marL="0" marR="0" marT="0" marB="0" anchor="ctr"/>
+                </a:tc>
+                <a:tc>
+                  <a:txBody>
+                    <a:bodyPr/>
+                    <a:lstStyle/>
+                    <a:p>
+                      <a:pPr algn="l" fontAlgn="t"/>
+                      <a:r>
+                        <a:rPr lang="es-ES" sz="700" u="none" strike="noStrike">
+                          <a:effectLst/>
+                        </a:rPr>
+                        <a:t>Distribucion de trabajo entre equipo de trabajo</a:t>
+                      </a:r>
+                      <a:endParaRPr lang="es-ES" sz="700" b="0" i="0" u="none" strike="noStrike">
+                        <a:solidFill>
+                          <a:srgbClr val="000000"/>
+                        </a:solidFill>
+                        <a:effectLst/>
+                        <a:latin typeface="Calibri" panose="020F0502020204030204" pitchFamily="34" charset="0"/>
+                      </a:endParaRPr>
+                    </a:p>
+                  </a:txBody>
+                  <a:tcPr marL="0" marR="0" marT="0" marB="0"/>
+                </a:tc>
+                <a:tc>
+                  <a:txBody>
+                    <a:bodyPr/>
+                    <a:lstStyle/>
+                    <a:p>
+                      <a:pPr algn="l" fontAlgn="t"/>
+                      <a:r>
+                        <a:rPr lang="es-ES" sz="700" u="none" strike="noStrike">
+                          <a:effectLst/>
+                        </a:rPr>
+                        <a:t>Contratacion y capacitacion de personal nuevo que pueda cubrir necesidades de clientes</a:t>
+                      </a:r>
+                      <a:endParaRPr lang="es-ES" sz="700" b="0" i="0" u="none" strike="noStrike">
+                        <a:solidFill>
+                          <a:srgbClr val="000000"/>
+                        </a:solidFill>
+                        <a:effectLst/>
+                        <a:latin typeface="Calibri" panose="020F0502020204030204" pitchFamily="34" charset="0"/>
+                      </a:endParaRPr>
+                    </a:p>
+                  </a:txBody>
+                  <a:tcPr marL="0" marR="0" marT="0" marB="0"/>
+                </a:tc>
+                <a:tc>
+                  <a:txBody>
+                    <a:bodyPr/>
+                    <a:lstStyle/>
+                    <a:p>
+                      <a:pPr algn="ctr" fontAlgn="ctr"/>
+                      <a:r>
+                        <a:rPr lang="es-MX" sz="700" u="none" strike="noStrike">
+                          <a:effectLst/>
+                        </a:rPr>
+                        <a:t>Fidel Reyna</a:t>
+                      </a:r>
+                      <a:endParaRPr lang="es-MX" sz="700" b="0" i="0" u="none" strike="noStrike">
+                        <a:solidFill>
+                          <a:srgbClr val="000000"/>
+                        </a:solidFill>
+                        <a:effectLst/>
+                        <a:latin typeface="Calibri" panose="020F0502020204030204" pitchFamily="34" charset="0"/>
+                      </a:endParaRPr>
+                    </a:p>
+                  </a:txBody>
+                  <a:tcPr marL="0" marR="0" marT="0" marB="0" anchor="ctr"/>
+                </a:tc>
+                <a:tc>
+                  <a:txBody>
+                    <a:bodyPr/>
+                    <a:lstStyle/>
+                    <a:p>
+                      <a:pPr algn="ctr" fontAlgn="ctr"/>
+                      <a:r>
+                        <a:rPr lang="es-MX" sz="700" u="none" strike="noStrike">
+                          <a:effectLst/>
+                        </a:rPr>
+                        <a:t>Abierto</a:t>
+                      </a:r>
+                      <a:endParaRPr lang="es-MX" sz="700" b="0" i="0" u="none" strike="noStrike">
+                        <a:solidFill>
+                          <a:srgbClr val="000000"/>
+                        </a:solidFill>
+                        <a:effectLst/>
+                        <a:latin typeface="Calibri" panose="020F0502020204030204" pitchFamily="34" charset="0"/>
+                      </a:endParaRPr>
+                    </a:p>
+                  </a:txBody>
+                  <a:tcPr marL="0" marR="0" marT="0" marB="0" anchor="ctr"/>
+                </a:tc>
+              </a:tr>
+              <a:tr h="376981">
+                <a:tc>
+                  <a:txBody>
+                    <a:bodyPr/>
+                    <a:lstStyle/>
+                    <a:p>
+                      <a:pPr algn="ctr" fontAlgn="ctr"/>
+                      <a:r>
+                        <a:rPr lang="es-MX" sz="700" u="none" strike="noStrike">
+                          <a:effectLst/>
+                        </a:rPr>
+                        <a:t>8</a:t>
+                      </a:r>
+                      <a:endParaRPr lang="es-MX" sz="700" b="0" i="0" u="none" strike="noStrike">
+                        <a:solidFill>
+                          <a:srgbClr val="000000"/>
+                        </a:solidFill>
+                        <a:effectLst/>
+                        <a:latin typeface="Calibri" panose="020F0502020204030204" pitchFamily="34" charset="0"/>
+                      </a:endParaRPr>
+                    </a:p>
+                  </a:txBody>
+                  <a:tcPr marL="0" marR="0" marT="0" marB="0" anchor="ctr"/>
+                </a:tc>
+                <a:tc>
+                  <a:txBody>
+                    <a:bodyPr/>
+                    <a:lstStyle/>
+                    <a:p>
+                      <a:pPr algn="l" fontAlgn="t"/>
+                      <a:r>
+                        <a:rPr lang="es-MX" sz="700" u="none" strike="noStrike">
+                          <a:effectLst/>
+                        </a:rPr>
+                        <a:t>Perdida de repositorio de datos</a:t>
+                      </a:r>
+                      <a:endParaRPr lang="es-MX" sz="700" b="0" i="0" u="none" strike="noStrike">
+                        <a:solidFill>
+                          <a:srgbClr val="000000"/>
+                        </a:solidFill>
+                        <a:effectLst/>
+                        <a:latin typeface="Calibri" panose="020F0502020204030204" pitchFamily="34" charset="0"/>
+                      </a:endParaRPr>
+                    </a:p>
+                  </a:txBody>
+                  <a:tcPr marL="0" marR="0" marT="0" marB="0"/>
+                </a:tc>
+                <a:tc>
+                  <a:txBody>
+                    <a:bodyPr/>
+                    <a:lstStyle/>
+                    <a:p>
+                      <a:pPr algn="ctr" fontAlgn="ctr"/>
+                      <a:r>
+                        <a:rPr lang="es-MX" sz="700" u="none" strike="noStrike">
+                          <a:effectLst/>
+                        </a:rPr>
+                        <a:t>5</a:t>
+                      </a:r>
+                      <a:endParaRPr lang="es-MX" sz="700" b="0" i="0" u="none" strike="noStrike">
+                        <a:solidFill>
+                          <a:srgbClr val="000000"/>
+                        </a:solidFill>
+                        <a:effectLst/>
+                        <a:latin typeface="Calibri" panose="020F0502020204030204" pitchFamily="34" charset="0"/>
+                      </a:endParaRPr>
+                    </a:p>
+                  </a:txBody>
+                  <a:tcPr marL="0" marR="0" marT="0" marB="0" anchor="ctr"/>
+                </a:tc>
+                <a:tc>
+                  <a:txBody>
+                    <a:bodyPr/>
+                    <a:lstStyle/>
+                    <a:p>
+                      <a:pPr algn="ctr" fontAlgn="ctr"/>
+                      <a:r>
+                        <a:rPr lang="es-MX" sz="700" u="none" strike="noStrike">
+                          <a:effectLst/>
+                        </a:rPr>
+                        <a:t>15%</a:t>
+                      </a:r>
+                      <a:endParaRPr lang="es-MX" sz="700" b="0" i="0" u="none" strike="noStrike">
+                        <a:solidFill>
+                          <a:srgbClr val="000000"/>
+                        </a:solidFill>
+                        <a:effectLst/>
+                        <a:latin typeface="Calibri" panose="020F0502020204030204" pitchFamily="34" charset="0"/>
+                      </a:endParaRPr>
+                    </a:p>
+                  </a:txBody>
+                  <a:tcPr marL="0" marR="0" marT="0" marB="0" anchor="ctr"/>
+                </a:tc>
+                <a:tc>
+                  <a:txBody>
+                    <a:bodyPr/>
+                    <a:lstStyle/>
+                    <a:p>
+                      <a:pPr algn="ctr" fontAlgn="ctr"/>
+                      <a:r>
+                        <a:rPr lang="es-MX" sz="700" u="none" strike="noStrike">
+                          <a:effectLst/>
+                        </a:rPr>
+                        <a:t>0,75</a:t>
+                      </a:r>
+                      <a:endParaRPr lang="es-MX" sz="700" b="0" i="0" u="none" strike="noStrike">
+                        <a:solidFill>
+                          <a:srgbClr val="000000"/>
+                        </a:solidFill>
+                        <a:effectLst/>
+                        <a:latin typeface="Calibri" panose="020F0502020204030204" pitchFamily="34" charset="0"/>
+                      </a:endParaRPr>
+                    </a:p>
+                  </a:txBody>
+                  <a:tcPr marL="0" marR="0" marT="0" marB="0" anchor="ctr"/>
+                </a:tc>
+                <a:tc>
+                  <a:txBody>
+                    <a:bodyPr/>
+                    <a:lstStyle/>
+                    <a:p>
+                      <a:pPr algn="ctr" fontAlgn="ctr"/>
+                      <a:r>
+                        <a:rPr lang="es-MX" sz="700" u="none" strike="noStrike">
+                          <a:effectLst/>
+                        </a:rPr>
+                        <a:t>4</a:t>
+                      </a:r>
+                      <a:endParaRPr lang="es-MX" sz="700" b="0" i="0" u="none" strike="noStrike">
+                        <a:solidFill>
+                          <a:srgbClr val="000000"/>
+                        </a:solidFill>
+                        <a:effectLst/>
+                        <a:latin typeface="Calibri" panose="020F0502020204030204" pitchFamily="34" charset="0"/>
+                      </a:endParaRPr>
+                    </a:p>
+                  </a:txBody>
+                  <a:tcPr marL="0" marR="0" marT="0" marB="0" anchor="ctr"/>
+                </a:tc>
+                <a:tc>
+                  <a:txBody>
+                    <a:bodyPr/>
+                    <a:lstStyle/>
+                    <a:p>
+                      <a:pPr algn="l" fontAlgn="t"/>
+                      <a:r>
+                        <a:rPr lang="es-ES" sz="700" u="none" strike="noStrike">
+                          <a:effectLst/>
+                        </a:rPr>
+                        <a:t>Generar espaldo secundario en maquinas ajenas al repositorio</a:t>
+                      </a:r>
+                      <a:endParaRPr lang="es-ES" sz="700" b="0" i="0" u="none" strike="noStrike">
+                        <a:solidFill>
+                          <a:srgbClr val="000000"/>
+                        </a:solidFill>
+                        <a:effectLst/>
+                        <a:latin typeface="Calibri" panose="020F0502020204030204" pitchFamily="34" charset="0"/>
+                      </a:endParaRPr>
+                    </a:p>
+                  </a:txBody>
+                  <a:tcPr marL="0" marR="0" marT="0" marB="0"/>
+                </a:tc>
+                <a:tc>
+                  <a:txBody>
+                    <a:bodyPr/>
+                    <a:lstStyle/>
+                    <a:p>
+                      <a:pPr algn="l" fontAlgn="t"/>
+                      <a:r>
+                        <a:rPr lang="es-ES" sz="700" u="none" strike="noStrike">
+                          <a:effectLst/>
+                        </a:rPr>
+                        <a:t>Generacion de un repositorio nuevo que contenga los datos del proyecto agregados</a:t>
+                      </a:r>
+                      <a:endParaRPr lang="es-ES" sz="700" b="0" i="0" u="none" strike="noStrike">
+                        <a:solidFill>
+                          <a:srgbClr val="000000"/>
+                        </a:solidFill>
+                        <a:effectLst/>
+                        <a:latin typeface="Calibri" panose="020F0502020204030204" pitchFamily="34" charset="0"/>
+                      </a:endParaRPr>
+                    </a:p>
+                  </a:txBody>
+                  <a:tcPr marL="0" marR="0" marT="0" marB="0"/>
+                </a:tc>
+                <a:tc>
+                  <a:txBody>
+                    <a:bodyPr/>
+                    <a:lstStyle/>
+                    <a:p>
+                      <a:pPr algn="ctr" fontAlgn="ctr"/>
+                      <a:r>
+                        <a:rPr lang="es-MX" sz="700" u="none" strike="noStrike">
+                          <a:effectLst/>
+                        </a:rPr>
+                        <a:t>Jovanny Zepeda</a:t>
+                      </a:r>
+                      <a:endParaRPr lang="es-MX" sz="700" b="0" i="0" u="none" strike="noStrike">
+                        <a:solidFill>
+                          <a:srgbClr val="000000"/>
+                        </a:solidFill>
+                        <a:effectLst/>
+                        <a:latin typeface="Calibri" panose="020F0502020204030204" pitchFamily="34" charset="0"/>
+                      </a:endParaRPr>
+                    </a:p>
+                  </a:txBody>
+                  <a:tcPr marL="0" marR="0" marT="0" marB="0" anchor="ctr"/>
+                </a:tc>
+                <a:tc>
+                  <a:txBody>
+                    <a:bodyPr/>
+                    <a:lstStyle/>
+                    <a:p>
+                      <a:pPr algn="ctr" fontAlgn="ctr"/>
+                      <a:r>
                         <a:rPr lang="es-MX" sz="700" u="none" strike="noStrike" dirty="0">
                           <a:effectLst/>
                         </a:rPr>
@@ -5445,6 +7265,44 @@
           </a:graphicData>
         </a:graphic>
       </p:graphicFrame>
+      <p:sp>
+        <p:nvSpPr>
+          <p:cNvPr id="5" name="CuadroTexto 4"/>
+          <p:cNvSpPr txBox="1"/>
+          <p:nvPr/>
+        </p:nvSpPr>
+        <p:spPr>
+          <a:xfrm>
+            <a:off x="457200" y="5373216"/>
+            <a:ext cx="8686800" cy="923330"/>
+          </a:xfrm>
+          <a:prstGeom prst="rect">
+            <a:avLst/>
+          </a:prstGeom>
+          <a:noFill/>
+        </p:spPr>
+        <p:txBody>
+          <a:bodyPr wrap="square" rtlCol="0">
+            <a:spAutoFit/>
+          </a:bodyPr>
+          <a:lstStyle/>
+          <a:p>
+            <a:r>
+              <a:rPr lang="es-MX" dirty="0" smtClean="0"/>
+              <a:t>Se genera plan </a:t>
+            </a:r>
+            <a:r>
+              <a:rPr lang="es-MX" smtClean="0"/>
+              <a:t>de mitigación </a:t>
+            </a:r>
+            <a:r>
+              <a:rPr lang="es-MX" dirty="0" smtClean="0"/>
+              <a:t>para la posible perdida del servidor almacenando los respaldos en repositorio GIT a su vez se mitiga la posible falla del servicio web definiendo que se debe realizar un mantenimiento cada cierre de mes.</a:t>
+            </a:r>
+            <a:endParaRPr lang="es-MX" dirty="0"/>
+          </a:p>
+        </p:txBody>
+      </p:sp>
     </p:spTree>
     <p:extLst>
       <p:ext uri="{BB962C8B-B14F-4D97-AF65-F5344CB8AC3E}">
@@ -5763,6 +7621,413 @@
 </p:sld>
 </file>
 
+<file path=ppt/slides/slide13.xml><?xml version="1.0" encoding="utf-8"?>
+<p:sld xmlns:a="http://schemas.openxmlformats.org/drawingml/2006/main" xmlns:r="http://schemas.openxmlformats.org/officeDocument/2006/relationships" xmlns:p="http://schemas.openxmlformats.org/presentationml/2006/main">
+  <p:cSld>
+    <p:spTree>
+      <p:nvGrpSpPr>
+        <p:cNvPr id="1" name=""/>
+        <p:cNvGrpSpPr/>
+        <p:nvPr/>
+      </p:nvGrpSpPr>
+      <p:grpSpPr>
+        <a:xfrm>
+          <a:off x="0" y="0"/>
+          <a:ext cx="0" cy="0"/>
+          <a:chOff x="0" y="0"/>
+          <a:chExt cx="0" cy="0"/>
+        </a:xfrm>
+      </p:grpSpPr>
+      <p:graphicFrame>
+        <p:nvGraphicFramePr>
+          <p:cNvPr id="4" name="Tabla 3"/>
+          <p:cNvGraphicFramePr>
+            <a:graphicFrameLocks noGrp="1"/>
+          </p:cNvGraphicFramePr>
+          <p:nvPr>
+            <p:extLst>
+              <p:ext uri="{D42A27DB-BD31-4B8C-83A1-F6EECF244321}">
+                <p14:modId xmlns:p14="http://schemas.microsoft.com/office/powerpoint/2010/main" val="3479460689"/>
+              </p:ext>
+            </p:extLst>
+          </p:nvPr>
+        </p:nvGraphicFramePr>
+        <p:xfrm>
+          <a:off x="1547664" y="2348880"/>
+          <a:ext cx="6048672" cy="2232248"/>
+        </p:xfrm>
+        <a:graphic>
+          <a:graphicData uri="http://schemas.openxmlformats.org/drawingml/2006/table">
+            <a:tbl>
+              <a:tblPr>
+                <a:tableStyleId>{5C22544A-7EE6-4342-B048-85BDC9FD1C3A}</a:tableStyleId>
+              </a:tblPr>
+              <a:tblGrid>
+                <a:gridCol w="963939"/>
+                <a:gridCol w="2048368"/>
+                <a:gridCol w="1927877"/>
+                <a:gridCol w="1108488"/>
+              </a:tblGrid>
+              <a:tr h="528242">
+                <a:tc gridSpan="4">
+                  <a:txBody>
+                    <a:bodyPr/>
+                    <a:lstStyle/>
+                    <a:p>
+                      <a:pPr algn="ctr" fontAlgn="ctr"/>
+                      <a:r>
+                        <a:rPr lang="es-ES" sz="1100" u="none" strike="noStrike" dirty="0" smtClean="0">
+                          <a:effectLst/>
+                        </a:rPr>
+                        <a:t>Bitácora </a:t>
+                      </a:r>
+                      <a:r>
+                        <a:rPr lang="es-ES" sz="1100" u="none" strike="noStrike" dirty="0">
+                          <a:effectLst/>
+                        </a:rPr>
+                        <a:t>de Respaldos semanales en el servicio de tickets</a:t>
+                      </a:r>
+                      <a:endParaRPr lang="es-ES" sz="1100" b="0" i="0" u="none" strike="noStrike" dirty="0">
+                        <a:solidFill>
+                          <a:srgbClr val="000000"/>
+                        </a:solidFill>
+                        <a:effectLst/>
+                        <a:latin typeface="Calibri" panose="020F0502020204030204" pitchFamily="34" charset="0"/>
+                      </a:endParaRPr>
+                    </a:p>
+                  </a:txBody>
+                  <a:tcPr marL="9525" marR="9525" marT="9525" marB="0" anchor="ctr"/>
+                </a:tc>
+                <a:tc hMerge="1">
+                  <a:txBody>
+                    <a:bodyPr/>
+                    <a:lstStyle/>
+                    <a:p>
+                      <a:endParaRPr lang="es-MX"/>
+                    </a:p>
+                  </a:txBody>
+                  <a:tcPr/>
+                </a:tc>
+                <a:tc hMerge="1">
+                  <a:txBody>
+                    <a:bodyPr/>
+                    <a:lstStyle/>
+                    <a:p>
+                      <a:endParaRPr lang="es-MX"/>
+                    </a:p>
+                  </a:txBody>
+                  <a:tcPr/>
+                </a:tc>
+                <a:tc hMerge="1">
+                  <a:txBody>
+                    <a:bodyPr/>
+                    <a:lstStyle/>
+                    <a:p>
+                      <a:endParaRPr lang="es-MX"/>
+                    </a:p>
+                  </a:txBody>
+                  <a:tcPr/>
+                </a:tc>
+              </a:tr>
+              <a:tr h="568002">
+                <a:tc>
+                  <a:txBody>
+                    <a:bodyPr/>
+                    <a:lstStyle/>
+                    <a:p>
+                      <a:pPr algn="l" fontAlgn="b"/>
+                      <a:r>
+                        <a:rPr lang="es-MX" sz="1100" u="none" strike="noStrike">
+                          <a:effectLst/>
+                        </a:rPr>
+                        <a:t>Fecha </a:t>
+                      </a:r>
+                      <a:endParaRPr lang="es-MX" sz="1100" b="0" i="0" u="none" strike="noStrike">
+                        <a:solidFill>
+                          <a:srgbClr val="000000"/>
+                        </a:solidFill>
+                        <a:effectLst/>
+                        <a:latin typeface="Calibri" panose="020F0502020204030204" pitchFamily="34" charset="0"/>
+                      </a:endParaRPr>
+                    </a:p>
+                  </a:txBody>
+                  <a:tcPr marL="9525" marR="9525" marT="9525" marB="0" anchor="b"/>
+                </a:tc>
+                <a:tc>
+                  <a:txBody>
+                    <a:bodyPr/>
+                    <a:lstStyle/>
+                    <a:p>
+                      <a:pPr algn="ctr" fontAlgn="b"/>
+                      <a:r>
+                        <a:rPr lang="es-MX" sz="1100" u="none" strike="noStrike">
+                          <a:effectLst/>
+                        </a:rPr>
+                        <a:t>Responsable </a:t>
+                      </a:r>
+                      <a:endParaRPr lang="es-MX" sz="1100" b="0" i="0" u="none" strike="noStrike">
+                        <a:solidFill>
+                          <a:srgbClr val="000000"/>
+                        </a:solidFill>
+                        <a:effectLst/>
+                        <a:latin typeface="Calibri" panose="020F0502020204030204" pitchFamily="34" charset="0"/>
+                      </a:endParaRPr>
+                    </a:p>
+                  </a:txBody>
+                  <a:tcPr marL="9525" marR="9525" marT="9525" marB="0" anchor="b"/>
+                </a:tc>
+                <a:tc>
+                  <a:txBody>
+                    <a:bodyPr/>
+                    <a:lstStyle/>
+                    <a:p>
+                      <a:pPr algn="ctr" fontAlgn="b"/>
+                      <a:r>
+                        <a:rPr lang="es-MX" sz="1100" u="none" strike="noStrike" dirty="0">
+                          <a:effectLst/>
+                        </a:rPr>
+                        <a:t>fecha en Repositorio</a:t>
+                      </a:r>
+                      <a:endParaRPr lang="es-MX" sz="1100" b="0" i="0" u="none" strike="noStrike" dirty="0">
+                        <a:solidFill>
+                          <a:srgbClr val="000000"/>
+                        </a:solidFill>
+                        <a:effectLst/>
+                        <a:latin typeface="Calibri" panose="020F0502020204030204" pitchFamily="34" charset="0"/>
+                      </a:endParaRPr>
+                    </a:p>
+                  </a:txBody>
+                  <a:tcPr marL="9525" marR="9525" marT="9525" marB="0" anchor="b"/>
+                </a:tc>
+                <a:tc>
+                  <a:txBody>
+                    <a:bodyPr/>
+                    <a:lstStyle/>
+                    <a:p>
+                      <a:pPr algn="l" fontAlgn="b"/>
+                      <a:r>
+                        <a:rPr lang="es-MX" sz="1100" u="none" strike="noStrike">
+                          <a:effectLst/>
+                        </a:rPr>
+                        <a:t>Estado</a:t>
+                      </a:r>
+                      <a:endParaRPr lang="es-MX" sz="1100" b="0" i="0" u="none" strike="noStrike">
+                        <a:solidFill>
+                          <a:srgbClr val="000000"/>
+                        </a:solidFill>
+                        <a:effectLst/>
+                        <a:latin typeface="Calibri" panose="020F0502020204030204" pitchFamily="34" charset="0"/>
+                      </a:endParaRPr>
+                    </a:p>
+                  </a:txBody>
+                  <a:tcPr marL="9525" marR="9525" marT="9525" marB="0" anchor="b"/>
+                </a:tc>
+              </a:tr>
+              <a:tr h="568002">
+                <a:tc>
+                  <a:txBody>
+                    <a:bodyPr/>
+                    <a:lstStyle/>
+                    <a:p>
+                      <a:pPr algn="r" fontAlgn="b"/>
+                      <a:r>
+                        <a:rPr lang="es-MX" sz="1100" u="none" strike="noStrike">
+                          <a:effectLst/>
+                        </a:rPr>
+                        <a:t>20/03/2015</a:t>
+                      </a:r>
+                      <a:endParaRPr lang="es-MX" sz="1100" b="0" i="0" u="none" strike="noStrike">
+                        <a:solidFill>
+                          <a:srgbClr val="000000"/>
+                        </a:solidFill>
+                        <a:effectLst/>
+                        <a:latin typeface="Calibri" panose="020F0502020204030204" pitchFamily="34" charset="0"/>
+                      </a:endParaRPr>
+                    </a:p>
+                  </a:txBody>
+                  <a:tcPr marL="9525" marR="9525" marT="9525" marB="0" anchor="b"/>
+                </a:tc>
+                <a:tc>
+                  <a:txBody>
+                    <a:bodyPr/>
+                    <a:lstStyle/>
+                    <a:p>
+                      <a:pPr algn="ctr" fontAlgn="b"/>
+                      <a:r>
+                        <a:rPr lang="es-MX" sz="1100" u="none" strike="noStrike">
+                          <a:effectLst/>
+                        </a:rPr>
+                        <a:t>Jovanny Zepeda</a:t>
+                      </a:r>
+                      <a:endParaRPr lang="es-MX" sz="1100" b="0" i="0" u="none" strike="noStrike">
+                        <a:solidFill>
+                          <a:srgbClr val="000000"/>
+                        </a:solidFill>
+                        <a:effectLst/>
+                        <a:latin typeface="Calibri" panose="020F0502020204030204" pitchFamily="34" charset="0"/>
+                      </a:endParaRPr>
+                    </a:p>
+                  </a:txBody>
+                  <a:tcPr marL="9525" marR="9525" marT="9525" marB="0" anchor="b"/>
+                </a:tc>
+                <a:tc>
+                  <a:txBody>
+                    <a:bodyPr/>
+                    <a:lstStyle/>
+                    <a:p>
+                      <a:pPr algn="ctr" fontAlgn="b"/>
+                      <a:r>
+                        <a:rPr lang="es-MX" sz="1100" u="none" strike="noStrike">
+                          <a:effectLst/>
+                        </a:rPr>
+                        <a:t>20/03/2015</a:t>
+                      </a:r>
+                      <a:endParaRPr lang="es-MX" sz="1100" b="0" i="0" u="none" strike="noStrike">
+                        <a:solidFill>
+                          <a:srgbClr val="000000"/>
+                        </a:solidFill>
+                        <a:effectLst/>
+                        <a:latin typeface="Calibri" panose="020F0502020204030204" pitchFamily="34" charset="0"/>
+                      </a:endParaRPr>
+                    </a:p>
+                  </a:txBody>
+                  <a:tcPr marL="9525" marR="9525" marT="9525" marB="0" anchor="b"/>
+                </a:tc>
+                <a:tc>
+                  <a:txBody>
+                    <a:bodyPr/>
+                    <a:lstStyle/>
+                    <a:p>
+                      <a:pPr algn="l" fontAlgn="b"/>
+                      <a:r>
+                        <a:rPr lang="es-MX" sz="1100" u="none" strike="noStrike" dirty="0">
+                          <a:effectLst/>
+                        </a:rPr>
+                        <a:t>Realizada</a:t>
+                      </a:r>
+                      <a:endParaRPr lang="es-MX" sz="1100" b="0" i="0" u="none" strike="noStrike" dirty="0">
+                        <a:solidFill>
+                          <a:srgbClr val="000000"/>
+                        </a:solidFill>
+                        <a:effectLst/>
+                        <a:latin typeface="Calibri" panose="020F0502020204030204" pitchFamily="34" charset="0"/>
+                      </a:endParaRPr>
+                    </a:p>
+                  </a:txBody>
+                  <a:tcPr marL="9525" marR="9525" marT="9525" marB="0" anchor="b"/>
+                </a:tc>
+              </a:tr>
+              <a:tr h="568002">
+                <a:tc>
+                  <a:txBody>
+                    <a:bodyPr/>
+                    <a:lstStyle/>
+                    <a:p>
+                      <a:pPr algn="r" fontAlgn="b"/>
+                      <a:r>
+                        <a:rPr lang="es-MX" sz="1100" u="none" strike="noStrike">
+                          <a:effectLst/>
+                        </a:rPr>
+                        <a:t>27/03/2015</a:t>
+                      </a:r>
+                      <a:endParaRPr lang="es-MX" sz="1100" b="0" i="0" u="none" strike="noStrike">
+                        <a:solidFill>
+                          <a:srgbClr val="000000"/>
+                        </a:solidFill>
+                        <a:effectLst/>
+                        <a:latin typeface="Calibri" panose="020F0502020204030204" pitchFamily="34" charset="0"/>
+                      </a:endParaRPr>
+                    </a:p>
+                  </a:txBody>
+                  <a:tcPr marL="9525" marR="9525" marT="9525" marB="0" anchor="b"/>
+                </a:tc>
+                <a:tc>
+                  <a:txBody>
+                    <a:bodyPr/>
+                    <a:lstStyle/>
+                    <a:p>
+                      <a:pPr algn="ctr" fontAlgn="b"/>
+                      <a:r>
+                        <a:rPr lang="es-MX" sz="1100" u="none" strike="noStrike">
+                          <a:effectLst/>
+                        </a:rPr>
+                        <a:t>Jovanny Zepeda</a:t>
+                      </a:r>
+                      <a:endParaRPr lang="es-MX" sz="1100" b="0" i="0" u="none" strike="noStrike">
+                        <a:solidFill>
+                          <a:srgbClr val="000000"/>
+                        </a:solidFill>
+                        <a:effectLst/>
+                        <a:latin typeface="Calibri" panose="020F0502020204030204" pitchFamily="34" charset="0"/>
+                      </a:endParaRPr>
+                    </a:p>
+                  </a:txBody>
+                  <a:tcPr marL="9525" marR="9525" marT="9525" marB="0" anchor="b"/>
+                </a:tc>
+                <a:tc>
+                  <a:txBody>
+                    <a:bodyPr/>
+                    <a:lstStyle/>
+                    <a:p>
+                      <a:pPr algn="ctr" fontAlgn="b"/>
+                      <a:r>
+                        <a:rPr lang="es-MX" sz="1100" u="none" strike="noStrike">
+                          <a:effectLst/>
+                        </a:rPr>
+                        <a:t>27/03/2015</a:t>
+                      </a:r>
+                      <a:endParaRPr lang="es-MX" sz="1100" b="0" i="0" u="none" strike="noStrike">
+                        <a:solidFill>
+                          <a:srgbClr val="000000"/>
+                        </a:solidFill>
+                        <a:effectLst/>
+                        <a:latin typeface="Calibri" panose="020F0502020204030204" pitchFamily="34" charset="0"/>
+                      </a:endParaRPr>
+                    </a:p>
+                  </a:txBody>
+                  <a:tcPr marL="9525" marR="9525" marT="9525" marB="0" anchor="b"/>
+                </a:tc>
+                <a:tc>
+                  <a:txBody>
+                    <a:bodyPr/>
+                    <a:lstStyle/>
+                    <a:p>
+                      <a:pPr algn="l" fontAlgn="b"/>
+                      <a:r>
+                        <a:rPr lang="es-MX" sz="1100" u="none" strike="noStrike" dirty="0">
+                          <a:effectLst/>
+                        </a:rPr>
+                        <a:t>Realizada</a:t>
+                      </a:r>
+                      <a:endParaRPr lang="es-MX" sz="1100" b="0" i="0" u="none" strike="noStrike" dirty="0">
+                        <a:solidFill>
+                          <a:srgbClr val="000000"/>
+                        </a:solidFill>
+                        <a:effectLst/>
+                        <a:latin typeface="Calibri" panose="020F0502020204030204" pitchFamily="34" charset="0"/>
+                      </a:endParaRPr>
+                    </a:p>
+                  </a:txBody>
+                  <a:tcPr marL="9525" marR="9525" marT="9525" marB="0" anchor="b"/>
+                </a:tc>
+              </a:tr>
+            </a:tbl>
+          </a:graphicData>
+        </a:graphic>
+      </p:graphicFrame>
+    </p:spTree>
+    <p:extLst>
+      <p:ext uri="{BB962C8B-B14F-4D97-AF65-F5344CB8AC3E}">
+        <p14:creationId xmlns:p14="http://schemas.microsoft.com/office/powerpoint/2010/main" val="1938167233"/>
+      </p:ext>
+    </p:extLst>
+  </p:cSld>
+  <p:clrMapOvr>
+    <a:masterClrMapping/>
+  </p:clrMapOvr>
+</p:sld>
+</file>
+
 <file path=ppt/slides/slide2.xml><?xml version="1.0" encoding="utf-8"?>
 <p:sld xmlns:a="http://schemas.openxmlformats.org/drawingml/2006/main" xmlns:r="http://schemas.openxmlformats.org/officeDocument/2006/relationships" xmlns:p="http://schemas.openxmlformats.org/presentationml/2006/main">
   <p:cSld>
@@ -6443,7 +8708,7 @@
         <p:spPr>
           <a:xfrm>
             <a:off x="5220072" y="1416240"/>
-            <a:ext cx="3168352" cy="1200329"/>
+            <a:ext cx="3168352" cy="2585323"/>
           </a:xfrm>
           <a:prstGeom prst="rect">
             <a:avLst/>
@@ -6458,7 +8723,7 @@
           <a:p>
             <a:r>
               <a:rPr lang="es-MX" dirty="0" smtClean="0"/>
-              <a:t>Tras la adquisición de los primeros clientes se comienzan a generar gastos en servicio y planeación.</a:t>
+              <a:t>Tras la adquisición de los primeros clientes se comienzan a generar gastos en servicio y planeación, sin embargo se muestra una desviación lo suficientemente grande por lo que se deberá poner énfasis en el problema presentado.</a:t>
             </a:r>
             <a:endParaRPr lang="es-MX" dirty="0"/>
           </a:p>
@@ -6466,10 +8731,10 @@
       </p:sp>
       <p:graphicFrame>
         <p:nvGraphicFramePr>
-          <p:cNvPr id="7" name="1 Gráfico">
+          <p:cNvPr id="8" name="1 Gráfico">
             <a:extLst>
               <a:ext uri="{FF2B5EF4-FFF2-40B4-BE49-F238E27FC236}">
-                <a16:creationId xmlns:lc="http://schemas.openxmlformats.org/drawingml/2006/lockedCanvas" xmlns:a16="http://schemas.microsoft.com/office/drawing/2014/main" xmlns="" xmlns:xdr="http://schemas.openxmlformats.org/drawingml/2006/spreadsheetDrawing" id="{00000000-0008-0000-0200-000002000000}"/>
+                <a16:creationId xmlns:lc="http://schemas.openxmlformats.org/drawingml/2006/lockedCanvas" xmlns="" xmlns:a16="http://schemas.microsoft.com/office/drawing/2014/main" xmlns:xdr="http://schemas.openxmlformats.org/drawingml/2006/spreadsheetDrawing" id="{00000000-0008-0000-0200-000002000000}"/>
               </a:ext>
             </a:extLst>
           </p:cNvPr>
@@ -6479,13 +8744,13 @@
           <p:nvPr>
             <p:extLst>
               <p:ext uri="{D42A27DB-BD31-4B8C-83A1-F6EECF244321}">
-                <p14:modId xmlns:p14="http://schemas.microsoft.com/office/powerpoint/2010/main" val="1594632305"/>
+                <p14:modId xmlns:p14="http://schemas.microsoft.com/office/powerpoint/2010/main" val="730193999"/>
               </p:ext>
             </p:extLst>
           </p:nvPr>
         </p:nvGraphicFramePr>
         <p:xfrm>
-          <a:off x="457200" y="908720"/>
+          <a:off x="552822" y="836712"/>
           <a:ext cx="4667250" cy="2819400"/>
         </p:xfrm>
         <a:graphic>
@@ -6496,10 +8761,10 @@
       </p:graphicFrame>
       <p:graphicFrame>
         <p:nvGraphicFramePr>
-          <p:cNvPr id="6" name="2 Gráfico">
+          <p:cNvPr id="9" name="2 Gráfico">
             <a:extLst>
               <a:ext uri="{FF2B5EF4-FFF2-40B4-BE49-F238E27FC236}">
-                <a16:creationId xmlns:xdr="http://schemas.openxmlformats.org/drawingml/2006/spreadsheetDrawing" xmlns:a16="http://schemas.microsoft.com/office/drawing/2014/main" xmlns="" xmlns:lc="http://schemas.openxmlformats.org/drawingml/2006/lockedCanvas" id="{00000000-0008-0000-0200-000003000000}"/>
+                <a16:creationId xmlns:lc="http://schemas.openxmlformats.org/drawingml/2006/lockedCanvas" xmlns="" xmlns:a16="http://schemas.microsoft.com/office/drawing/2014/main" xmlns:xdr="http://schemas.openxmlformats.org/drawingml/2006/spreadsheetDrawing" id="{00000000-0008-0000-0200-000003000000}"/>
               </a:ext>
             </a:extLst>
           </p:cNvPr>
@@ -6509,13 +8774,13 @@
           <p:nvPr>
             <p:extLst>
               <p:ext uri="{D42A27DB-BD31-4B8C-83A1-F6EECF244321}">
-                <p14:modId xmlns:p14="http://schemas.microsoft.com/office/powerpoint/2010/main" val="549633474"/>
+                <p14:modId xmlns:p14="http://schemas.microsoft.com/office/powerpoint/2010/main" val="3871681303"/>
               </p:ext>
             </p:extLst>
           </p:nvPr>
         </p:nvGraphicFramePr>
         <p:xfrm>
-          <a:off x="457200" y="3645024"/>
+          <a:off x="654422" y="3861048"/>
           <a:ext cx="4565650" cy="2800350"/>
         </p:xfrm>
         <a:graphic>
@@ -6649,10 +8914,10 @@
       </p:sp>
       <p:graphicFrame>
         <p:nvGraphicFramePr>
-          <p:cNvPr id="6" name="4 Gráfico">
+          <p:cNvPr id="8" name="2 Gráfico">
             <a:extLst>
               <a:ext uri="{FF2B5EF4-FFF2-40B4-BE49-F238E27FC236}">
-                <a16:creationId xmlns:xdr="http://schemas.openxmlformats.org/drawingml/2006/spreadsheetDrawing" xmlns:a16="http://schemas.microsoft.com/office/drawing/2014/main" xmlns="" xmlns:lc="http://schemas.openxmlformats.org/drawingml/2006/lockedCanvas" id="{00000000-0008-0000-0100-000005000000}"/>
+                <a16:creationId xmlns:lc="http://schemas.openxmlformats.org/drawingml/2006/lockedCanvas" xmlns="" xmlns:a16="http://schemas.microsoft.com/office/drawing/2014/main" xmlns:xdr="http://schemas.openxmlformats.org/drawingml/2006/spreadsheetDrawing" id="{00000000-0008-0000-0100-000003000000}"/>
               </a:ext>
             </a:extLst>
           </p:cNvPr>
@@ -6662,14 +8927,14 @@
           <p:nvPr>
             <p:extLst>
               <p:ext uri="{D42A27DB-BD31-4B8C-83A1-F6EECF244321}">
-                <p14:modId xmlns:p14="http://schemas.microsoft.com/office/powerpoint/2010/main" val="4002751295"/>
+                <p14:modId xmlns:p14="http://schemas.microsoft.com/office/powerpoint/2010/main" val="1795556889"/>
               </p:ext>
             </p:extLst>
           </p:nvPr>
         </p:nvGraphicFramePr>
         <p:xfrm>
-          <a:off x="611560" y="4078872"/>
-          <a:ext cx="7776864" cy="2800350"/>
+          <a:off x="457200" y="980728"/>
+          <a:ext cx="6703483" cy="2777067"/>
         </p:xfrm>
         <a:graphic>
           <a:graphicData uri="http://schemas.openxmlformats.org/drawingml/2006/chart">
@@ -6679,10 +8944,10 @@
       </p:graphicFrame>
       <p:graphicFrame>
         <p:nvGraphicFramePr>
-          <p:cNvPr id="7" name="2 Gráfico">
+          <p:cNvPr id="9" name="4 Gráfico">
             <a:extLst>
               <a:ext uri="{FF2B5EF4-FFF2-40B4-BE49-F238E27FC236}">
-                <a16:creationId xmlns:xdr="http://schemas.openxmlformats.org/drawingml/2006/spreadsheetDrawing" xmlns:a16="http://schemas.microsoft.com/office/drawing/2014/main" xmlns="" xmlns:lc="http://schemas.openxmlformats.org/drawingml/2006/lockedCanvas" id="{00000000-0008-0000-0100-000003000000}"/>
+                <a16:creationId xmlns:lc="http://schemas.openxmlformats.org/drawingml/2006/lockedCanvas" xmlns="" xmlns:a16="http://schemas.microsoft.com/office/drawing/2014/main" xmlns:xdr="http://schemas.openxmlformats.org/drawingml/2006/spreadsheetDrawing" id="{00000000-0008-0000-0100-000005000000}"/>
               </a:ext>
             </a:extLst>
           </p:cNvPr>
@@ -6692,14 +8957,14 @@
           <p:nvPr>
             <p:extLst>
               <p:ext uri="{D42A27DB-BD31-4B8C-83A1-F6EECF244321}">
-                <p14:modId xmlns:p14="http://schemas.microsoft.com/office/powerpoint/2010/main" val="2685008385"/>
+                <p14:modId xmlns:p14="http://schemas.microsoft.com/office/powerpoint/2010/main" val="3586893341"/>
               </p:ext>
             </p:extLst>
           </p:nvPr>
         </p:nvGraphicFramePr>
         <p:xfrm>
-          <a:off x="755576" y="1268760"/>
-          <a:ext cx="7704856" cy="2777067"/>
+          <a:off x="434978" y="3717032"/>
+          <a:ext cx="6426200" cy="2800350"/>
         </p:xfrm>
         <a:graphic>
           <a:graphicData uri="http://schemas.openxmlformats.org/drawingml/2006/chart">
@@ -6707,6 +8972,36 @@
           </a:graphicData>
         </a:graphic>
       </p:graphicFrame>
+      <p:sp>
+        <p:nvSpPr>
+          <p:cNvPr id="2" name="CuadroTexto 1"/>
+          <p:cNvSpPr txBox="1"/>
+          <p:nvPr/>
+        </p:nvSpPr>
+        <p:spPr>
+          <a:xfrm>
+            <a:off x="7092280" y="1124744"/>
+            <a:ext cx="1728192" cy="5078313"/>
+          </a:xfrm>
+          <a:prstGeom prst="rect">
+            <a:avLst/>
+          </a:prstGeom>
+          <a:noFill/>
+        </p:spPr>
+        <p:txBody>
+          <a:bodyPr wrap="square" rtlCol="0">
+            <a:spAutoFit/>
+          </a:bodyPr>
+          <a:lstStyle/>
+          <a:p>
+            <a:r>
+              <a:rPr lang="es-MX" dirty="0" smtClean="0"/>
+              <a:t>La Desviación del proyecto se encuentra muy elevada ya que la planeación del proyecto en cuestión de tiempo se ha reducido, mientras que la entrega del servicio al igual que en costos se encuentra en zona de atención</a:t>
+            </a:r>
+            <a:endParaRPr lang="es-MX" dirty="0"/>
+          </a:p>
+        </p:txBody>
+      </p:sp>
     </p:spTree>
   </p:cSld>
   <p:clrMapOvr>
@@ -7190,11 +9485,7 @@
           <a:p>
             <a:r>
               <a:rPr lang="es-MX" dirty="0" smtClean="0"/>
-              <a:t>Se generar auditoria a </a:t>
-            </a:r>
-            <a:r>
-              <a:rPr lang="es-MX" dirty="0" smtClean="0"/>
-              <a:t>reportes de monitoreo por primera ocasión , motivo por el cual se anexa esta sección en la grafica.</a:t>
+              <a:t>Se generar auditoria a reportes de monitoreo por primera ocasión , motivo por el cual se anexa esta sección en la grafica.</a:t>
             </a:r>
             <a:endParaRPr lang="es-MX" dirty="0"/>
           </a:p>
@@ -7377,7 +9668,7 @@
           <a:p>
             <a:r>
               <a:rPr lang="es-MX" dirty="0" smtClean="0"/>
-              <a:t>Se presenta un pequeño inconveniente en ejecución ya que por falta de contacto con clientes no se puede realizar a tiempo la encuesta de satisfacción.</a:t>
+              <a:t>En ejecución se obtiene un 80 % de la evaluación debido a la falta de encuestas de satisfacción requeridas por el proyecto de forma mensual.</a:t>
             </a:r>
             <a:endParaRPr lang="es-MX" dirty="0"/>
           </a:p>
@@ -7902,4 +10193,265 @@
   <a:objectDefaults/>
   <a:extraClrSchemeLst/>
 </a:theme>
+</file>
+
+<file path=ppt/theme/theme3.xml><?xml version="1.0" encoding="utf-8"?>
+<a:theme xmlns:a="http://schemas.openxmlformats.org/drawingml/2006/main" name="Tema de Office">
+  <a:themeElements>
+    <a:clrScheme name="Office">
+      <a:dk1>
+        <a:sysClr val="windowText" lastClr="000000"/>
+      </a:dk1>
+      <a:lt1>
+        <a:sysClr val="window" lastClr="FFFFFF"/>
+      </a:lt1>
+      <a:dk2>
+        <a:srgbClr val="44546A"/>
+      </a:dk2>
+      <a:lt2>
+        <a:srgbClr val="E7E6E6"/>
+      </a:lt2>
+      <a:accent1>
+        <a:srgbClr val="5B9BD5"/>
+      </a:accent1>
+      <a:accent2>
+        <a:srgbClr val="ED7D31"/>
+      </a:accent2>
+      <a:accent3>
+        <a:srgbClr val="A5A5A5"/>
+      </a:accent3>
+      <a:accent4>
+        <a:srgbClr val="FFC000"/>
+      </a:accent4>
+      <a:accent5>
+        <a:srgbClr val="4472C4"/>
+      </a:accent5>
+      <a:accent6>
+        <a:srgbClr val="70AD47"/>
+      </a:accent6>
+      <a:hlink>
+        <a:srgbClr val="0563C1"/>
+      </a:hlink>
+      <a:folHlink>
+        <a:srgbClr val="954F72"/>
+      </a:folHlink>
+    </a:clrScheme>
+    <a:fontScheme name="Office">
+      <a:majorFont>
+        <a:latin typeface="Calibri Light" panose="020F0302020204030204"/>
+        <a:ea typeface=""/>
+        <a:cs typeface=""/>
+        <a:font script="Jpan" typeface="ＭＳ Ｐゴシック"/>
+        <a:font script="Hang" typeface="맑은 고딕"/>
+        <a:font script="Hans" typeface="宋体"/>
+        <a:font script="Hant" typeface="新細明體"/>
+        <a:font script="Arab" typeface="Times New Roman"/>
+        <a:font script="Hebr" typeface="Times New Roman"/>
+        <a:font script="Thai" typeface="Angsana New"/>
+        <a:font script="Ethi" typeface="Nyala"/>
+        <a:font script="Beng" typeface="Vrinda"/>
+        <a:font script="Gujr" typeface="Shruti"/>
+        <a:font script="Khmr" typeface="MoolBoran"/>
+        <a:font script="Knda" typeface="Tunga"/>
+        <a:font script="Guru" typeface="Raavi"/>
+        <a:font script="Cans" typeface="Euphemia"/>
+        <a:font script="Cher" typeface="Plantagenet Cherokee"/>
+        <a:font script="Yiii" typeface="Microsoft Yi Baiti"/>
+        <a:font script="Tibt" typeface="Microsoft Himalaya"/>
+        <a:font script="Thaa" typeface="MV Boli"/>
+        <a:font script="Deva" typeface="Mangal"/>
+        <a:font script="Telu" typeface="Gautami"/>
+        <a:font script="Taml" typeface="Latha"/>
+        <a:font script="Syrc" typeface="Estrangelo Edessa"/>
+        <a:font script="Orya" typeface="Kalinga"/>
+        <a:font script="Mlym" typeface="Kartika"/>
+        <a:font script="Laoo" typeface="DokChampa"/>
+        <a:font script="Sinh" typeface="Iskoola Pota"/>
+        <a:font script="Mong" typeface="Mongolian Baiti"/>
+        <a:font script="Viet" typeface="Times New Roman"/>
+        <a:font script="Uigh" typeface="Microsoft Uighur"/>
+        <a:font script="Geor" typeface="Sylfaen"/>
+      </a:majorFont>
+      <a:minorFont>
+        <a:latin typeface="Calibri" panose="020F0502020204030204"/>
+        <a:ea typeface=""/>
+        <a:cs typeface=""/>
+        <a:font script="Jpan" typeface="ＭＳ Ｐゴシック"/>
+        <a:font script="Hang" typeface="맑은 고딕"/>
+        <a:font script="Hans" typeface="宋体"/>
+        <a:font script="Hant" typeface="新細明體"/>
+        <a:font script="Arab" typeface="Arial"/>
+        <a:font script="Hebr" typeface="Arial"/>
+        <a:font script="Thai" typeface="Cordia New"/>
+        <a:font script="Ethi" typeface="Nyala"/>
+        <a:font script="Beng" typeface="Vrinda"/>
+        <a:font script="Gujr" typeface="Shruti"/>
+        <a:font script="Khmr" typeface="DaunPenh"/>
+        <a:font script="Knda" typeface="Tunga"/>
+        <a:font script="Guru" typeface="Raavi"/>
+        <a:font script="Cans" typeface="Euphemia"/>
+        <a:font script="Cher" typeface="Plantagenet Cherokee"/>
+        <a:font script="Yiii" typeface="Microsoft Yi Baiti"/>
+        <a:font script="Tibt" typeface="Microsoft Himalaya"/>
+        <a:font script="Thaa" typeface="MV Boli"/>
+        <a:font script="Deva" typeface="Mangal"/>
+        <a:font script="Telu" typeface="Gautami"/>
+        <a:font script="Taml" typeface="Latha"/>
+        <a:font script="Syrc" typeface="Estrangelo Edessa"/>
+        <a:font script="Orya" typeface="Kalinga"/>
+        <a:font script="Mlym" typeface="Kartika"/>
+        <a:font script="Laoo" typeface="DokChampa"/>
+        <a:font script="Sinh" typeface="Iskoola Pota"/>
+        <a:font script="Mong" typeface="Mongolian Baiti"/>
+        <a:font script="Viet" typeface="Arial"/>
+        <a:font script="Uigh" typeface="Microsoft Uighur"/>
+        <a:font script="Geor" typeface="Sylfaen"/>
+      </a:minorFont>
+    </a:fontScheme>
+    <a:fmtScheme name="Office">
+      <a:fillStyleLst>
+        <a:solidFill>
+          <a:schemeClr val="phClr"/>
+        </a:solidFill>
+        <a:gradFill rotWithShape="1">
+          <a:gsLst>
+            <a:gs pos="0">
+              <a:schemeClr val="phClr">
+                <a:lumMod val="110000"/>
+                <a:satMod val="105000"/>
+                <a:tint val="67000"/>
+              </a:schemeClr>
+            </a:gs>
+            <a:gs pos="50000">
+              <a:schemeClr val="phClr">
+                <a:lumMod val="105000"/>
+                <a:satMod val="103000"/>
+                <a:tint val="73000"/>
+              </a:schemeClr>
+            </a:gs>
+            <a:gs pos="100000">
+              <a:schemeClr val="phClr">
+                <a:lumMod val="105000"/>
+                <a:satMod val="109000"/>
+                <a:tint val="81000"/>
+              </a:schemeClr>
+            </a:gs>
+          </a:gsLst>
+          <a:lin ang="5400000" scaled="0"/>
+        </a:gradFill>
+        <a:gradFill rotWithShape="1">
+          <a:gsLst>
+            <a:gs pos="0">
+              <a:schemeClr val="phClr">
+                <a:satMod val="103000"/>
+                <a:lumMod val="102000"/>
+                <a:tint val="94000"/>
+              </a:schemeClr>
+            </a:gs>
+            <a:gs pos="50000">
+              <a:schemeClr val="phClr">
+                <a:satMod val="110000"/>
+                <a:lumMod val="100000"/>
+                <a:shade val="100000"/>
+              </a:schemeClr>
+            </a:gs>
+            <a:gs pos="100000">
+              <a:schemeClr val="phClr">
+                <a:lumMod val="99000"/>
+                <a:satMod val="120000"/>
+                <a:shade val="78000"/>
+              </a:schemeClr>
+            </a:gs>
+          </a:gsLst>
+          <a:lin ang="5400000" scaled="0"/>
+        </a:gradFill>
+      </a:fillStyleLst>
+      <a:lnStyleLst>
+        <a:ln w="6350" cap="flat" cmpd="sng" algn="ctr">
+          <a:solidFill>
+            <a:schemeClr val="phClr"/>
+          </a:solidFill>
+          <a:prstDash val="solid"/>
+          <a:miter lim="800000"/>
+        </a:ln>
+        <a:ln w="12700" cap="flat" cmpd="sng" algn="ctr">
+          <a:solidFill>
+            <a:schemeClr val="phClr"/>
+          </a:solidFill>
+          <a:prstDash val="solid"/>
+          <a:miter lim="800000"/>
+        </a:ln>
+        <a:ln w="19050" cap="flat" cmpd="sng" algn="ctr">
+          <a:solidFill>
+            <a:schemeClr val="phClr"/>
+          </a:solidFill>
+          <a:prstDash val="solid"/>
+          <a:miter lim="800000"/>
+        </a:ln>
+      </a:lnStyleLst>
+      <a:effectStyleLst>
+        <a:effectStyle>
+          <a:effectLst/>
+        </a:effectStyle>
+        <a:effectStyle>
+          <a:effectLst/>
+        </a:effectStyle>
+        <a:effectStyle>
+          <a:effectLst>
+            <a:outerShdw blurRad="57150" dist="19050" dir="5400000" algn="ctr" rotWithShape="0">
+              <a:srgbClr val="000000">
+                <a:alpha val="63000"/>
+              </a:srgbClr>
+            </a:outerShdw>
+          </a:effectLst>
+        </a:effectStyle>
+      </a:effectStyleLst>
+      <a:bgFillStyleLst>
+        <a:solidFill>
+          <a:schemeClr val="phClr"/>
+        </a:solidFill>
+        <a:solidFill>
+          <a:schemeClr val="phClr">
+            <a:tint val="95000"/>
+            <a:satMod val="170000"/>
+          </a:schemeClr>
+        </a:solidFill>
+        <a:gradFill rotWithShape="1">
+          <a:gsLst>
+            <a:gs pos="0">
+              <a:schemeClr val="phClr">
+                <a:tint val="93000"/>
+                <a:satMod val="150000"/>
+                <a:shade val="98000"/>
+                <a:lumMod val="102000"/>
+              </a:schemeClr>
+            </a:gs>
+            <a:gs pos="50000">
+              <a:schemeClr val="phClr">
+                <a:tint val="98000"/>
+                <a:satMod val="130000"/>
+                <a:shade val="90000"/>
+                <a:lumMod val="103000"/>
+              </a:schemeClr>
+            </a:gs>
+            <a:gs pos="100000">
+              <a:schemeClr val="phClr">
+                <a:shade val="63000"/>
+                <a:satMod val="120000"/>
+              </a:schemeClr>
+            </a:gs>
+          </a:gsLst>
+          <a:lin ang="5400000" scaled="0"/>
+        </a:gradFill>
+      </a:bgFillStyleLst>
+    </a:fmtScheme>
+  </a:themeElements>
+  <a:objectDefaults/>
+  <a:extraClrSchemeLst/>
+  <a:extLst>
+    <a:ext uri="{05A4C25C-085E-4340-85A3-A5531E510DB2}">
+      <thm15:themeFamily xmlns:thm15="http://schemas.microsoft.com/office/thememl/2012/main" name="Office Theme" id="{62F939B6-93AF-4DB8-9C6B-D6C7DFDC589F}" vid="{4A3C46E8-61CC-4603-A589-7422A47A8E4A}"/>
+    </a:ext>
+  </a:extLst>
+</a:theme>
 </file>
</xml_diff>